<commit_message>
I can't prove RrhoR algolithm.
</commit_message>
<xml_diff>
--- a/量子状態トモグラフィー.pptx
+++ b/量子状態トモグラフィー.pptx
@@ -19,9 +19,9 @@
     <p:sldId id="273" r:id="rId13"/>
     <p:sldId id="275" r:id="rId14"/>
     <p:sldId id="276" r:id="rId15"/>
-    <p:sldId id="277" r:id="rId16"/>
-    <p:sldId id="269" r:id="rId17"/>
-    <p:sldId id="278" r:id="rId18"/>
+    <p:sldId id="269" r:id="rId16"/>
+    <p:sldId id="278" r:id="rId17"/>
+    <p:sldId id="277" r:id="rId18"/>
     <p:sldId id="279" r:id="rId19"/>
     <p:sldId id="280" r:id="rId20"/>
     <p:sldId id="285" r:id="rId21"/>
@@ -272,7 +272,7 @@
           <a:p>
             <a:fld id="{A0E85D1A-51D4-4A02-939E-733F82A6E593}" type="datetimeFigureOut">
               <a:rPr kumimoji="1" lang="ja-JP" altLang="en-US" smtClean="0"/>
-              <a:t>2020/2/7</a:t>
+              <a:t>2020/2/10</a:t>
             </a:fld>
             <a:endParaRPr kumimoji="1" lang="ja-JP" altLang="en-US"/>
           </a:p>
@@ -474,7 +474,7 @@
           <a:p>
             <a:fld id="{A0E85D1A-51D4-4A02-939E-733F82A6E593}" type="datetimeFigureOut">
               <a:rPr kumimoji="1" lang="ja-JP" altLang="en-US" smtClean="0"/>
-              <a:t>2020/2/7</a:t>
+              <a:t>2020/2/10</a:t>
             </a:fld>
             <a:endParaRPr kumimoji="1" lang="ja-JP" altLang="en-US"/>
           </a:p>
@@ -686,7 +686,7 @@
           <a:p>
             <a:fld id="{A0E85D1A-51D4-4A02-939E-733F82A6E593}" type="datetimeFigureOut">
               <a:rPr kumimoji="1" lang="ja-JP" altLang="en-US" smtClean="0"/>
-              <a:t>2020/2/7</a:t>
+              <a:t>2020/2/10</a:t>
             </a:fld>
             <a:endParaRPr kumimoji="1" lang="ja-JP" altLang="en-US"/>
           </a:p>
@@ -888,7 +888,7 @@
           <a:p>
             <a:fld id="{A0E85D1A-51D4-4A02-939E-733F82A6E593}" type="datetimeFigureOut">
               <a:rPr kumimoji="1" lang="ja-JP" altLang="en-US" smtClean="0"/>
-              <a:t>2020/2/7</a:t>
+              <a:t>2020/2/10</a:t>
             </a:fld>
             <a:endParaRPr kumimoji="1" lang="ja-JP" altLang="en-US"/>
           </a:p>
@@ -1134,7 +1134,7 @@
           <a:p>
             <a:fld id="{A0E85D1A-51D4-4A02-939E-733F82A6E593}" type="datetimeFigureOut">
               <a:rPr kumimoji="1" lang="ja-JP" altLang="en-US" smtClean="0"/>
-              <a:t>2020/2/7</a:t>
+              <a:t>2020/2/10</a:t>
             </a:fld>
             <a:endParaRPr kumimoji="1" lang="ja-JP" altLang="en-US"/>
           </a:p>
@@ -1430,7 +1430,7 @@
           <a:p>
             <a:fld id="{A0E85D1A-51D4-4A02-939E-733F82A6E593}" type="datetimeFigureOut">
               <a:rPr kumimoji="1" lang="ja-JP" altLang="en-US" smtClean="0"/>
-              <a:t>2020/2/7</a:t>
+              <a:t>2020/2/10</a:t>
             </a:fld>
             <a:endParaRPr kumimoji="1" lang="ja-JP" altLang="en-US"/>
           </a:p>
@@ -1861,7 +1861,7 @@
           <a:p>
             <a:fld id="{A0E85D1A-51D4-4A02-939E-733F82A6E593}" type="datetimeFigureOut">
               <a:rPr kumimoji="1" lang="ja-JP" altLang="en-US" smtClean="0"/>
-              <a:t>2020/2/7</a:t>
+              <a:t>2020/2/10</a:t>
             </a:fld>
             <a:endParaRPr kumimoji="1" lang="ja-JP" altLang="en-US"/>
           </a:p>
@@ -1979,7 +1979,7 @@
           <a:p>
             <a:fld id="{A0E85D1A-51D4-4A02-939E-733F82A6E593}" type="datetimeFigureOut">
               <a:rPr kumimoji="1" lang="ja-JP" altLang="en-US" smtClean="0"/>
-              <a:t>2020/2/7</a:t>
+              <a:t>2020/2/10</a:t>
             </a:fld>
             <a:endParaRPr kumimoji="1" lang="ja-JP" altLang="en-US"/>
           </a:p>
@@ -2074,7 +2074,7 @@
           <a:p>
             <a:fld id="{A0E85D1A-51D4-4A02-939E-733F82A6E593}" type="datetimeFigureOut">
               <a:rPr kumimoji="1" lang="ja-JP" altLang="en-US" smtClean="0"/>
-              <a:t>2020/2/7</a:t>
+              <a:t>2020/2/10</a:t>
             </a:fld>
             <a:endParaRPr kumimoji="1" lang="ja-JP" altLang="en-US"/>
           </a:p>
@@ -2383,7 +2383,7 @@
           <a:p>
             <a:fld id="{A0E85D1A-51D4-4A02-939E-733F82A6E593}" type="datetimeFigureOut">
               <a:rPr kumimoji="1" lang="ja-JP" altLang="en-US" smtClean="0"/>
-              <a:t>2020/2/7</a:t>
+              <a:t>2020/2/10</a:t>
             </a:fld>
             <a:endParaRPr kumimoji="1" lang="ja-JP" altLang="en-US"/>
           </a:p>
@@ -2636,7 +2636,7 @@
           <a:p>
             <a:fld id="{A0E85D1A-51D4-4A02-939E-733F82A6E593}" type="datetimeFigureOut">
               <a:rPr kumimoji="1" lang="ja-JP" altLang="en-US" smtClean="0"/>
-              <a:t>2020/2/7</a:t>
+              <a:t>2020/2/10</a:t>
             </a:fld>
             <a:endParaRPr kumimoji="1" lang="ja-JP" altLang="en-US"/>
           </a:p>
@@ -2881,7 +2881,7 @@
           <a:p>
             <a:fld id="{A0E85D1A-51D4-4A02-939E-733F82A6E593}" type="datetimeFigureOut">
               <a:rPr kumimoji="1" lang="ja-JP" altLang="en-US" smtClean="0"/>
-              <a:t>2020/2/7</a:t>
+              <a:t>2020/2/10</a:t>
             </a:fld>
             <a:endParaRPr kumimoji="1" lang="ja-JP" altLang="en-US"/>
           </a:p>
@@ -5356,7 +5356,13 @@
                       <a:rPr lang="en-US" altLang="ja-JP" sz="2400" b="0" i="1" smtClean="0">
                         <a:latin typeface="Cambria Math" panose="02040503050406030204" pitchFamily="18" charset="0"/>
                       </a:rPr>
-                      <m:t>2)</m:t>
+                      <m:t>2</m:t>
+                    </m:r>
+                    <m:r>
+                      <a:rPr lang="en-US" altLang="ja-JP" sz="2400" b="0" i="1" smtClean="0">
+                        <a:latin typeface="Cambria Math" panose="02040503050406030204" pitchFamily="18" charset="0"/>
+                      </a:rPr>
+                      <m:t>)</m:t>
                     </m:r>
                     <m:r>
                       <m:rPr>
@@ -5384,7 +5390,13 @@
                       <a:rPr lang="en-US" altLang="ja-JP" sz="2400" i="1">
                         <a:latin typeface="Cambria Math" panose="02040503050406030204" pitchFamily="18" charset="0"/>
                       </a:rPr>
-                      <m:t>2)</m:t>
+                      <m:t>2</m:t>
+                    </m:r>
+                    <m:r>
+                      <a:rPr lang="en-US" altLang="ja-JP" sz="2400" i="1">
+                        <a:latin typeface="Cambria Math" panose="02040503050406030204" pitchFamily="18" charset="0"/>
+                      </a:rPr>
+                      <m:t>)</m:t>
                     </m:r>
                     <m:r>
                       <m:rPr>
@@ -5425,7 +5437,13 @@
                       <a:rPr lang="en-US" altLang="ja-JP" sz="2400" i="1">
                         <a:latin typeface="Cambria Math" panose="02040503050406030204" pitchFamily="18" charset="0"/>
                       </a:rPr>
-                      <m:t>2)</m:t>
+                      <m:t>2</m:t>
+                    </m:r>
+                    <m:r>
+                      <a:rPr lang="en-US" altLang="ja-JP" sz="2400" i="1">
+                        <a:latin typeface="Cambria Math" panose="02040503050406030204" pitchFamily="18" charset="0"/>
+                      </a:rPr>
+                      <m:t>)</m:t>
                     </m:r>
                   </m:oMath>
                 </a14:m>
@@ -5942,13 +5960,20 @@
                               <a:latin typeface="Cambria Math" panose="02040503050406030204" pitchFamily="18" charset="0"/>
                               <a:ea typeface="Cambria Math" panose="02040503050406030204" pitchFamily="18" charset="0"/>
                             </a:rPr>
-                            <m:t>1,</m:t>
+                            <m:t>1</m:t>
                           </m:r>
                           <m:r>
                             <a:rPr lang="en-US" altLang="ja-JP" sz="2400" b="0" i="1" smtClean="0">
                               <a:latin typeface="Cambria Math" panose="02040503050406030204" pitchFamily="18" charset="0"/>
                               <a:ea typeface="Cambria Math" panose="02040503050406030204" pitchFamily="18" charset="0"/>
                             </a:rPr>
+                            <m:t>,</m:t>
+                          </m:r>
+                          <m:r>
+                            <a:rPr lang="en-US" altLang="ja-JP" sz="2400" b="0" i="1" smtClean="0">
+                              <a:latin typeface="Cambria Math" panose="02040503050406030204" pitchFamily="18" charset="0"/>
+                              <a:ea typeface="Cambria Math" panose="02040503050406030204" pitchFamily="18" charset="0"/>
+                            </a:rPr>
                             <m:t>𝑗</m:t>
                           </m:r>
                           <m:r>
@@ -5956,7 +5981,21 @@
                               <a:latin typeface="Cambria Math" panose="02040503050406030204" pitchFamily="18" charset="0"/>
                               <a:ea typeface="Cambria Math" panose="02040503050406030204" pitchFamily="18" charset="0"/>
                             </a:rPr>
-                            <m:t>2=0</m:t>
+                            <m:t>2</m:t>
+                          </m:r>
+                          <m:r>
+                            <a:rPr lang="en-US" altLang="ja-JP" sz="2400" b="0" i="1" smtClean="0">
+                              <a:latin typeface="Cambria Math" panose="02040503050406030204" pitchFamily="18" charset="0"/>
+                              <a:ea typeface="Cambria Math" panose="02040503050406030204" pitchFamily="18" charset="0"/>
+                            </a:rPr>
+                            <m:t>=</m:t>
+                          </m:r>
+                          <m:r>
+                            <a:rPr lang="en-US" altLang="ja-JP" sz="2400" b="0" i="1" smtClean="0">
+                              <a:latin typeface="Cambria Math" panose="02040503050406030204" pitchFamily="18" charset="0"/>
+                              <a:ea typeface="Cambria Math" panose="02040503050406030204" pitchFamily="18" charset="0"/>
+                            </a:rPr>
+                            <m:t>0</m:t>
                           </m:r>
                         </m:sub>
                         <m:sup>
@@ -5989,7 +6028,13 @@
                             <a:rPr lang="en-US" altLang="ja-JP" sz="2400" b="0" i="1" smtClean="0">
                               <a:latin typeface="Cambria Math" panose="02040503050406030204" pitchFamily="18" charset="0"/>
                             </a:rPr>
-                            <m:t>−1</m:t>
+                            <m:t>−</m:t>
+                          </m:r>
+                          <m:r>
+                            <a:rPr lang="en-US" altLang="ja-JP" sz="2400" b="0" i="1" smtClean="0">
+                              <a:latin typeface="Cambria Math" panose="02040503050406030204" pitchFamily="18" charset="0"/>
+                            </a:rPr>
+                            <m:t>1</m:t>
                           </m:r>
                         </m:sup>
                         <m:e>
@@ -6024,7 +6069,14 @@
                                   <a:latin typeface="Cambria Math" panose="02040503050406030204" pitchFamily="18" charset="0"/>
                                   <a:ea typeface="Cambria Math" panose="02040503050406030204" pitchFamily="18" charset="0"/>
                                 </a:rPr>
-                                <m:t>1,</m:t>
+                                <m:t>1</m:t>
+                              </m:r>
+                              <m:r>
+                                <a:rPr lang="en-US" altLang="ja-JP" sz="2400" b="0" i="1" smtClean="0">
+                                  <a:latin typeface="Cambria Math" panose="02040503050406030204" pitchFamily="18" charset="0"/>
+                                  <a:ea typeface="Cambria Math" panose="02040503050406030204" pitchFamily="18" charset="0"/>
+                                </a:rPr>
+                                <m:t>,</m:t>
                               </m:r>
                               <m:r>
                                 <a:rPr lang="en-US" altLang="ja-JP" sz="2400" b="0" i="1" smtClean="0">
@@ -6349,7 +6401,14 @@
                               <a:latin typeface="Cambria Math" panose="02040503050406030204" pitchFamily="18" charset="0"/>
                               <a:ea typeface="Cambria Math" panose="02040503050406030204" pitchFamily="18" charset="0"/>
                             </a:rPr>
-                            <m:t>=0</m:t>
+                            <m:t>=</m:t>
+                          </m:r>
+                          <m:r>
+                            <a:rPr lang="en-US" altLang="ja-JP" sz="2400" i="1">
+                              <a:latin typeface="Cambria Math" panose="02040503050406030204" pitchFamily="18" charset="0"/>
+                              <a:ea typeface="Cambria Math" panose="02040503050406030204" pitchFamily="18" charset="0"/>
+                            </a:rPr>
+                            <m:t>0</m:t>
                           </m:r>
                         </m:sub>
                         <m:sup>
@@ -6382,7 +6441,13 @@
                             <a:rPr lang="en-US" altLang="ja-JP" sz="2400" i="1">
                               <a:latin typeface="Cambria Math" panose="02040503050406030204" pitchFamily="18" charset="0"/>
                             </a:rPr>
-                            <m:t>−1</m:t>
+                            <m:t>−</m:t>
+                          </m:r>
+                          <m:r>
+                            <a:rPr lang="en-US" altLang="ja-JP" sz="2400" i="1">
+                              <a:latin typeface="Cambria Math" panose="02040503050406030204" pitchFamily="18" charset="0"/>
+                            </a:rPr>
+                            <m:t>1</m:t>
                           </m:r>
                         </m:sup>
                         <m:e>
@@ -6417,7 +6482,14 @@
                                   <a:latin typeface="Cambria Math" panose="02040503050406030204" pitchFamily="18" charset="0"/>
                                   <a:ea typeface="Cambria Math" panose="02040503050406030204" pitchFamily="18" charset="0"/>
                                 </a:rPr>
-                                <m:t>1,…,</m:t>
+                                <m:t>1</m:t>
+                              </m:r>
+                              <m:r>
+                                <a:rPr lang="en-US" altLang="ja-JP" sz="2400" i="1">
+                                  <a:latin typeface="Cambria Math" panose="02040503050406030204" pitchFamily="18" charset="0"/>
+                                  <a:ea typeface="Cambria Math" panose="02040503050406030204" pitchFamily="18" charset="0"/>
+                                </a:rPr>
+                                <m:t>,…,</m:t>
                               </m:r>
                               <m:r>
                                 <a:rPr lang="en-US" altLang="ja-JP" sz="2400" i="1">
@@ -6694,8 +6766,8 @@
           </a:p>
         </p:txBody>
       </p:sp>
-      <mc:AlternateContent xmlns:mc="http://schemas.openxmlformats.org/markup-compatibility/2006" xmlns:a14="http://schemas.microsoft.com/office/drawing/2010/main">
-        <mc:Choice Requires="a14">
+      <mc:AlternateContent xmlns:mc="http://schemas.openxmlformats.org/markup-compatibility/2006">
+        <mc:Choice xmlns:a14="http://schemas.microsoft.com/office/drawing/2010/main" Requires="a14">
           <p:sp>
             <p:nvSpPr>
               <p:cNvPr id="3" name="コンテンツ プレースホルダー 2"/>
@@ -7140,18 +7212,30 @@
                         <m:ctrlPr>
                           <a:rPr lang="en-US" altLang="ja-JP" sz="2400" i="1">
                             <a:latin typeface="Cambria Math" panose="02040503050406030204" pitchFamily="18" charset="0"/>
-                            <a:ea typeface="Cambria Math" panose="02040503050406030204" pitchFamily="18" charset="0"/>
                           </a:rPr>
                         </m:ctrlPr>
                       </m:sSubPr>
                       <m:e>
-                        <m:r>
-                          <a:rPr lang="en-US" altLang="ja-JP" sz="2400" i="1">
-                            <a:latin typeface="Cambria Math" panose="02040503050406030204" pitchFamily="18" charset="0"/>
-                            <a:ea typeface="Cambria Math" panose="02040503050406030204" pitchFamily="18" charset="0"/>
-                          </a:rPr>
-                          <m:t>𝑟</m:t>
-                        </m:r>
+                        <m:acc>
+                          <m:accPr>
+                            <m:chr m:val="̃"/>
+                            <m:ctrlPr>
+                              <a:rPr lang="en-US" altLang="ja-JP" sz="2400" i="1">
+                                <a:latin typeface="Cambria Math" panose="02040503050406030204" pitchFamily="18" charset="0"/>
+                                <a:ea typeface="Cambria Math" panose="02040503050406030204" pitchFamily="18" charset="0"/>
+                              </a:rPr>
+                            </m:ctrlPr>
+                          </m:accPr>
+                          <m:e>
+                            <m:r>
+                              <a:rPr lang="en-US" altLang="ja-JP" sz="2400" i="1">
+                                <a:latin typeface="Cambria Math" panose="02040503050406030204" pitchFamily="18" charset="0"/>
+                                <a:ea typeface="Cambria Math" panose="02040503050406030204" pitchFamily="18" charset="0"/>
+                              </a:rPr>
+                              <m:t>𝑟</m:t>
+                            </m:r>
+                          </m:e>
+                        </m:acc>
                       </m:e>
                       <m:sub>
                         <m:r>
@@ -8230,7 +8314,7 @@
             </p:txBody>
           </p:sp>
         </mc:Choice>
-        <mc:Fallback xmlns="">
+        <mc:Fallback>
           <p:sp>
             <p:nvSpPr>
               <p:cNvPr id="3" name="コンテンツ プレースホルダー 2"/>
@@ -10080,318 +10164,6 @@
                   <a:buNone/>
                 </a:pPr>
                 <a:r>
-                  <a:rPr lang="ja-JP" altLang="en-US" sz="2400" dirty="0" smtClean="0"/>
-                  <a:t>これで密度行列は実験の測定基底と観測回数によって一意に求まるが、上の式で求めた密度行列が密度行列の最も重要な基本的性質を満たしているとは限らない。密度行列の性質は</a:t>
-                </a:r>
-                <a14:m>
-                  <m:oMath xmlns:m="http://schemas.openxmlformats.org/officeDocument/2006/math">
-                    <m:r>
-                      <m:rPr>
-                        <m:sty m:val="p"/>
-                      </m:rPr>
-                      <a:rPr lang="en-US" altLang="ja-JP" sz="2400">
-                        <a:latin typeface="Cambria Math" panose="02040503050406030204" pitchFamily="18" charset="0"/>
-                      </a:rPr>
-                      <m:t>Tr</m:t>
-                    </m:r>
-                    <m:d>
-                      <m:dPr>
-                        <m:begChr m:val="["/>
-                        <m:endChr m:val="]"/>
-                        <m:ctrlPr>
-                          <a:rPr lang="en-US" altLang="ja-JP" sz="2400" i="1">
-                            <a:latin typeface="Cambria Math" panose="02040503050406030204" pitchFamily="18" charset="0"/>
-                          </a:rPr>
-                        </m:ctrlPr>
-                      </m:dPr>
-                      <m:e>
-                        <m:acc>
-                          <m:accPr>
-                            <m:chr m:val="̂"/>
-                            <m:ctrlPr>
-                              <a:rPr lang="en-US" altLang="ja-JP" sz="2400" i="1" smtClean="0">
-                                <a:latin typeface="Cambria Math" panose="02040503050406030204" pitchFamily="18" charset="0"/>
-                              </a:rPr>
-                            </m:ctrlPr>
-                          </m:accPr>
-                          <m:e>
-                            <m:r>
-                              <a:rPr lang="ja-JP" altLang="en-US" sz="2400" i="1" smtClean="0">
-                                <a:latin typeface="Cambria Math" panose="02040503050406030204" pitchFamily="18" charset="0"/>
-                              </a:rPr>
-                              <m:t>𝜌</m:t>
-                            </m:r>
-                          </m:e>
-                        </m:acc>
-                      </m:e>
-                    </m:d>
-                    <m:r>
-                      <a:rPr lang="en-US" altLang="ja-JP" sz="2400" b="0" i="1" smtClean="0">
-                        <a:latin typeface="Cambria Math" panose="02040503050406030204" pitchFamily="18" charset="0"/>
-                      </a:rPr>
-                      <m:t>=1</m:t>
-                    </m:r>
-                  </m:oMath>
-                </a14:m>
-                <a:r>
-                  <a:rPr lang="ja-JP" altLang="en-US" sz="2400" dirty="0" smtClean="0"/>
-                  <a:t>で</a:t>
-                </a:r>
-                <a:r>
-                  <a:rPr lang="en-US" altLang="ja-JP" sz="2400" dirty="0" smtClean="0"/>
-                  <a:t>Hermitian</a:t>
-                </a:r>
-                <a:r>
-                  <a:rPr lang="ja-JP" altLang="en-US" sz="2400" dirty="0" smtClean="0"/>
-                  <a:t>である。また、固有値は</a:t>
-                </a:r>
-                <a14:m>
-                  <m:oMath xmlns:m="http://schemas.openxmlformats.org/officeDocument/2006/math">
-                    <m:d>
-                      <m:dPr>
-                        <m:begChr m:val="["/>
-                        <m:endChr m:val="]"/>
-                        <m:ctrlPr>
-                          <a:rPr lang="en-US" altLang="ja-JP" sz="2400" i="1" smtClean="0">
-                            <a:latin typeface="Cambria Math" panose="02040503050406030204" pitchFamily="18" charset="0"/>
-                          </a:rPr>
-                        </m:ctrlPr>
-                      </m:dPr>
-                      <m:e>
-                        <m:r>
-                          <a:rPr lang="en-US" altLang="ja-JP" sz="2400" b="0" i="1" smtClean="0">
-                            <a:latin typeface="Cambria Math" panose="02040503050406030204" pitchFamily="18" charset="0"/>
-                          </a:rPr>
-                          <m:t>0,1</m:t>
-                        </m:r>
-                      </m:e>
-                    </m:d>
-                    <m:r>
-                      <a:rPr lang="ja-JP" altLang="en-US" sz="2400" i="1">
-                        <a:latin typeface="Cambria Math" panose="02040503050406030204" pitchFamily="18" charset="0"/>
-                      </a:rPr>
-                      <m:t>でなければならない</m:t>
-                    </m:r>
-                  </m:oMath>
-                </a14:m>
-                <a:r>
-                  <a:rPr lang="ja-JP" altLang="en-US" sz="2400" dirty="0" smtClean="0"/>
-                  <a:t>。</a:t>
-                </a:r>
-                <a:endParaRPr lang="en-US" altLang="ja-JP" sz="2400" dirty="0" smtClean="0"/>
-              </a:p>
-              <a:p>
-                <a:pPr marL="0" indent="0">
-                  <a:buNone/>
-                </a:pPr>
-                <a:r>
-                  <a:rPr lang="ja-JP" altLang="en-US" sz="2400" dirty="0" smtClean="0"/>
-                  <a:t>この</a:t>
-                </a:r>
-                <a:r>
-                  <a:rPr lang="ja-JP" altLang="en-US" sz="2400" dirty="0"/>
-                  <a:t>問題</a:t>
-                </a:r>
-                <a:r>
-                  <a:rPr lang="ja-JP" altLang="en-US" sz="2400" dirty="0" smtClean="0"/>
-                  <a:t>を避けるために最尤推定を使う。手順は以下のとおりである。</a:t>
-                </a:r>
-                <a:endParaRPr lang="en-US" altLang="ja-JP" sz="2400" dirty="0" smtClean="0"/>
-              </a:p>
-              <a:p>
-                <a:pPr marL="514350" indent="-514350">
-                  <a:buFont typeface="+mj-lt"/>
-                  <a:buAutoNum type="romanLcPeriod"/>
-                </a:pPr>
-                <a:r>
-                  <a:rPr lang="ja-JP" altLang="en-US" sz="2400" dirty="0" smtClean="0"/>
-                  <a:t>密度行列の性質を満たす密度行列を生成する。</a:t>
-                </a:r>
-                <a:endParaRPr lang="en-US" altLang="ja-JP" sz="2400" dirty="0" smtClean="0"/>
-              </a:p>
-              <a:p>
-                <a:pPr marL="514350" indent="-514350">
-                  <a:buFont typeface="+mj-lt"/>
-                  <a:buAutoNum type="romanLcPeriod"/>
-                </a:pPr>
-                <a:r>
-                  <a:rPr lang="ja-JP" altLang="en-US" sz="2400" dirty="0" smtClean="0"/>
-                  <a:t>尤度関数を導入する。</a:t>
-                </a:r>
-                <a:endParaRPr lang="en-US" altLang="ja-JP" sz="2400" dirty="0" smtClean="0"/>
-              </a:p>
-              <a:p>
-                <a:pPr marL="514350" indent="-514350">
-                  <a:buFont typeface="+mj-lt"/>
-                  <a:buAutoNum type="romanLcPeriod"/>
-                </a:pPr>
-                <a:r>
-                  <a:rPr lang="en-US" altLang="ja-JP" sz="2400" dirty="0" smtClean="0"/>
-                  <a:t>Iterative</a:t>
-                </a:r>
-                <a:r>
-                  <a:rPr lang="ja-JP" altLang="en-US" sz="2400" dirty="0"/>
-                  <a:t>な</a:t>
-                </a:r>
-                <a:r>
-                  <a:rPr lang="ja-JP" altLang="en-US" sz="2400" dirty="0" smtClean="0"/>
-                  <a:t>アルゴリズムを用いて尤度関数を最大化させる。</a:t>
-                </a:r>
-                <a:endParaRPr lang="en-US" altLang="ja-JP" sz="2400" dirty="0" smtClean="0"/>
-              </a:p>
-            </p:txBody>
-          </p:sp>
-        </mc:Choice>
-        <mc:Fallback xmlns="">
-          <p:sp>
-            <p:nvSpPr>
-              <p:cNvPr id="3" name="コンテンツ プレースホルダー 2"/>
-              <p:cNvSpPr>
-                <a:spLocks noGrp="1" noRot="1" noChangeAspect="1" noMove="1" noResize="1" noEditPoints="1" noAdjustHandles="1" noChangeArrowheads="1" noChangeShapeType="1" noTextEdit="1"/>
-              </p:cNvSpPr>
-              <p:nvPr>
-                <p:ph idx="1"/>
-              </p:nvPr>
-            </p:nvSpPr>
-            <p:spPr>
-              <a:xfrm>
-                <a:off x="838200" y="1215614"/>
-                <a:ext cx="10515600" cy="4961349"/>
-              </a:xfrm>
-              <a:blipFill>
-                <a:blip r:embed="rId2"/>
-                <a:stretch>
-                  <a:fillRect l="-1043" t="-1597" r="-232"/>
-                </a:stretch>
-              </a:blipFill>
-            </p:spPr>
-            <p:txBody>
-              <a:bodyPr/>
-              <a:lstStyle/>
-              <a:p>
-                <a:r>
-                  <a:rPr lang="ja-JP" altLang="en-US">
-                    <a:noFill/>
-                  </a:rPr>
-                  <a:t> </a:t>
-                </a:r>
-              </a:p>
-            </p:txBody>
-          </p:sp>
-        </mc:Fallback>
-      </mc:AlternateContent>
-    </p:spTree>
-    <p:extLst>
-      <p:ext uri="{BB962C8B-B14F-4D97-AF65-F5344CB8AC3E}">
-        <p14:creationId xmlns:p14="http://schemas.microsoft.com/office/powerpoint/2010/main" val="2622380243"/>
-      </p:ext>
-    </p:extLst>
-  </p:cSld>
-  <p:clrMapOvr>
-    <a:masterClrMapping/>
-  </p:clrMapOvr>
-  <p:timing>
-    <p:tnLst>
-      <p:par>
-        <p:cTn id="1" dur="indefinite" restart="never" nodeType="tmRoot"/>
-      </p:par>
-    </p:tnLst>
-  </p:timing>
-</p:sld>
-</file>
-
-<file path=ppt/slides/slide16.xml><?xml version="1.0" encoding="utf-8"?>
-<p:sld xmlns:a="http://schemas.openxmlformats.org/drawingml/2006/main" xmlns:r="http://schemas.openxmlformats.org/officeDocument/2006/relationships" xmlns:p="http://schemas.openxmlformats.org/presentationml/2006/main">
-  <p:cSld>
-    <p:spTree>
-      <p:nvGrpSpPr>
-        <p:cNvPr id="1" name=""/>
-        <p:cNvGrpSpPr/>
-        <p:nvPr/>
-      </p:nvGrpSpPr>
-      <p:grpSpPr>
-        <a:xfrm>
-          <a:off x="0" y="0"/>
-          <a:ext cx="0" cy="0"/>
-          <a:chOff x="0" y="0"/>
-          <a:chExt cx="0" cy="0"/>
-        </a:xfrm>
-      </p:grpSpPr>
-      <p:sp>
-        <p:nvSpPr>
-          <p:cNvPr id="2" name="タイトル 1"/>
-          <p:cNvSpPr>
-            <a:spLocks noGrp="1"/>
-          </p:cNvSpPr>
-          <p:nvPr>
-            <p:ph type="title"/>
-          </p:nvPr>
-        </p:nvSpPr>
-        <p:spPr>
-          <a:xfrm>
-            <a:off x="838200" y="365125"/>
-            <a:ext cx="10515600" cy="473971"/>
-          </a:xfrm>
-          <a:ln>
-            <a:solidFill>
-              <a:schemeClr val="bg1"/>
-            </a:solidFill>
-          </a:ln>
-        </p:spPr>
-        <p:txBody>
-          <a:bodyPr>
-            <a:normAutofit fontScale="90000"/>
-          </a:bodyPr>
-          <a:lstStyle/>
-          <a:p>
-            <a:r>
-              <a:rPr lang="en-US" altLang="ja-JP" sz="2800" u="sng" dirty="0" smtClean="0"/>
-              <a:t>§</a:t>
-            </a:r>
-            <a:r>
-              <a:rPr lang="ja-JP" altLang="en-US" sz="2800" u="sng" dirty="0" smtClean="0"/>
-              <a:t>１</a:t>
-            </a:r>
-            <a:r>
-              <a:rPr lang="en-US" altLang="ja-JP" sz="2800" u="sng" dirty="0" smtClean="0"/>
-              <a:t>.</a:t>
-            </a:r>
-            <a:r>
-              <a:rPr lang="ja-JP" altLang="en-US" sz="2800" u="sng" dirty="0" smtClean="0"/>
-              <a:t>１　量子状態トモグラフィーの理論</a:t>
-            </a:r>
-            <a:endParaRPr kumimoji="1" lang="ja-JP" altLang="en-US" sz="2800" u="sng" dirty="0"/>
-          </a:p>
-        </p:txBody>
-      </p:sp>
-      <mc:AlternateContent xmlns:mc="http://schemas.openxmlformats.org/markup-compatibility/2006" xmlns:a14="http://schemas.microsoft.com/office/drawing/2010/main">
-        <mc:Choice Requires="a14">
-          <p:sp>
-            <p:nvSpPr>
-              <p:cNvPr id="3" name="コンテンツ プレースホルダー 2"/>
-              <p:cNvSpPr>
-                <a:spLocks noGrp="1"/>
-              </p:cNvSpPr>
-              <p:nvPr>
-                <p:ph idx="1"/>
-              </p:nvPr>
-            </p:nvSpPr>
-            <p:spPr>
-              <a:xfrm>
-                <a:off x="838200" y="1215614"/>
-                <a:ext cx="10515600" cy="4961349"/>
-              </a:xfrm>
-            </p:spPr>
-            <p:txBody>
-              <a:bodyPr>
-                <a:normAutofit/>
-              </a:bodyPr>
-              <a:lstStyle/>
-              <a:p>
-                <a:pPr marL="0" indent="0">
-                  <a:buNone/>
-                </a:pPr>
-                <a:r>
                   <a:rPr lang="en-US" altLang="ja-JP" sz="2400" dirty="0" smtClean="0">
                     <a:latin typeface="Cambria Math" panose="02040503050406030204" pitchFamily="18" charset="0"/>
                   </a:rPr>
@@ -11701,7 +11473,7 @@
 </p:sld>
 </file>
 
-<file path=ppt/slides/slide17.xml><?xml version="1.0" encoding="utf-8"?>
+<file path=ppt/slides/slide16.xml><?xml version="1.0" encoding="utf-8"?>
 <p:sld xmlns:a="http://schemas.openxmlformats.org/drawingml/2006/main" xmlns:r="http://schemas.openxmlformats.org/officeDocument/2006/relationships" xmlns:p="http://schemas.openxmlformats.org/presentationml/2006/main">
   <p:cSld>
     <p:spTree>
@@ -11788,6 +11560,318 @@
     <p:extLst>
       <p:ext uri="{BB962C8B-B14F-4D97-AF65-F5344CB8AC3E}">
         <p14:creationId xmlns:p14="http://schemas.microsoft.com/office/powerpoint/2010/main" val="1120412469"/>
+      </p:ext>
+    </p:extLst>
+  </p:cSld>
+  <p:clrMapOvr>
+    <a:masterClrMapping/>
+  </p:clrMapOvr>
+  <p:timing>
+    <p:tnLst>
+      <p:par>
+        <p:cTn id="1" dur="indefinite" restart="never" nodeType="tmRoot"/>
+      </p:par>
+    </p:tnLst>
+  </p:timing>
+</p:sld>
+</file>
+
+<file path=ppt/slides/slide17.xml><?xml version="1.0" encoding="utf-8"?>
+<p:sld xmlns:a="http://schemas.openxmlformats.org/drawingml/2006/main" xmlns:r="http://schemas.openxmlformats.org/officeDocument/2006/relationships" xmlns:p="http://schemas.openxmlformats.org/presentationml/2006/main">
+  <p:cSld>
+    <p:spTree>
+      <p:nvGrpSpPr>
+        <p:cNvPr id="1" name=""/>
+        <p:cNvGrpSpPr/>
+        <p:nvPr/>
+      </p:nvGrpSpPr>
+      <p:grpSpPr>
+        <a:xfrm>
+          <a:off x="0" y="0"/>
+          <a:ext cx="0" cy="0"/>
+          <a:chOff x="0" y="0"/>
+          <a:chExt cx="0" cy="0"/>
+        </a:xfrm>
+      </p:grpSpPr>
+      <p:sp>
+        <p:nvSpPr>
+          <p:cNvPr id="2" name="タイトル 1"/>
+          <p:cNvSpPr>
+            <a:spLocks noGrp="1"/>
+          </p:cNvSpPr>
+          <p:nvPr>
+            <p:ph type="title"/>
+          </p:nvPr>
+        </p:nvSpPr>
+        <p:spPr>
+          <a:xfrm>
+            <a:off x="838200" y="365125"/>
+            <a:ext cx="10515600" cy="473971"/>
+          </a:xfrm>
+          <a:ln>
+            <a:solidFill>
+              <a:schemeClr val="bg1"/>
+            </a:solidFill>
+          </a:ln>
+        </p:spPr>
+        <p:txBody>
+          <a:bodyPr>
+            <a:normAutofit fontScale="90000"/>
+          </a:bodyPr>
+          <a:lstStyle/>
+          <a:p>
+            <a:r>
+              <a:rPr lang="en-US" altLang="ja-JP" sz="2800" u="sng" dirty="0"/>
+              <a:t>§</a:t>
+            </a:r>
+            <a:r>
+              <a:rPr lang="ja-JP" altLang="en-US" sz="2800" u="sng" dirty="0"/>
+              <a:t>１</a:t>
+            </a:r>
+            <a:r>
+              <a:rPr lang="en-US" altLang="ja-JP" sz="2800" u="sng" dirty="0"/>
+              <a:t>.</a:t>
+            </a:r>
+            <a:r>
+              <a:rPr lang="ja-JP" altLang="en-US" sz="2800" u="sng" dirty="0"/>
+              <a:t>２　最尤推定</a:t>
+            </a:r>
+            <a:endParaRPr kumimoji="1" lang="ja-JP" altLang="en-US" sz="2800" u="sng" dirty="0"/>
+          </a:p>
+        </p:txBody>
+      </p:sp>
+      <mc:AlternateContent xmlns:mc="http://schemas.openxmlformats.org/markup-compatibility/2006" xmlns:a14="http://schemas.microsoft.com/office/drawing/2010/main">
+        <mc:Choice Requires="a14">
+          <p:sp>
+            <p:nvSpPr>
+              <p:cNvPr id="3" name="コンテンツ プレースホルダー 2"/>
+              <p:cNvSpPr>
+                <a:spLocks noGrp="1"/>
+              </p:cNvSpPr>
+              <p:nvPr>
+                <p:ph idx="1"/>
+              </p:nvPr>
+            </p:nvSpPr>
+            <p:spPr>
+              <a:xfrm>
+                <a:off x="838200" y="1215614"/>
+                <a:ext cx="10515600" cy="4961349"/>
+              </a:xfrm>
+            </p:spPr>
+            <p:txBody>
+              <a:bodyPr>
+                <a:normAutofit/>
+              </a:bodyPr>
+              <a:lstStyle/>
+              <a:p>
+                <a:pPr marL="0" indent="0">
+                  <a:buNone/>
+                </a:pPr>
+                <a:r>
+                  <a:rPr lang="ja-JP" altLang="en-US" sz="2400" dirty="0" smtClean="0"/>
+                  <a:t>これで密度行列は実験の測定基底と観測回数によって一意に求まるが、上の式で求めた密度行列が密度行列の最も重要な基本的性質を満たしているとは限らない。密度行列の性質は</a:t>
+                </a:r>
+                <a14:m>
+                  <m:oMath xmlns:m="http://schemas.openxmlformats.org/officeDocument/2006/math">
+                    <m:r>
+                      <m:rPr>
+                        <m:sty m:val="p"/>
+                      </m:rPr>
+                      <a:rPr lang="en-US" altLang="ja-JP" sz="2400">
+                        <a:latin typeface="Cambria Math" panose="02040503050406030204" pitchFamily="18" charset="0"/>
+                      </a:rPr>
+                      <m:t>Tr</m:t>
+                    </m:r>
+                    <m:d>
+                      <m:dPr>
+                        <m:begChr m:val="["/>
+                        <m:endChr m:val="]"/>
+                        <m:ctrlPr>
+                          <a:rPr lang="en-US" altLang="ja-JP" sz="2400" i="1">
+                            <a:latin typeface="Cambria Math" panose="02040503050406030204" pitchFamily="18" charset="0"/>
+                          </a:rPr>
+                        </m:ctrlPr>
+                      </m:dPr>
+                      <m:e>
+                        <m:acc>
+                          <m:accPr>
+                            <m:chr m:val="̂"/>
+                            <m:ctrlPr>
+                              <a:rPr lang="en-US" altLang="ja-JP" sz="2400" i="1" smtClean="0">
+                                <a:latin typeface="Cambria Math" panose="02040503050406030204" pitchFamily="18" charset="0"/>
+                              </a:rPr>
+                            </m:ctrlPr>
+                          </m:accPr>
+                          <m:e>
+                            <m:r>
+                              <a:rPr lang="ja-JP" altLang="en-US" sz="2400" i="1" smtClean="0">
+                                <a:latin typeface="Cambria Math" panose="02040503050406030204" pitchFamily="18" charset="0"/>
+                              </a:rPr>
+                              <m:t>𝜌</m:t>
+                            </m:r>
+                          </m:e>
+                        </m:acc>
+                      </m:e>
+                    </m:d>
+                    <m:r>
+                      <a:rPr lang="en-US" altLang="ja-JP" sz="2400" b="0" i="1" smtClean="0">
+                        <a:latin typeface="Cambria Math" panose="02040503050406030204" pitchFamily="18" charset="0"/>
+                      </a:rPr>
+                      <m:t>=1</m:t>
+                    </m:r>
+                  </m:oMath>
+                </a14:m>
+                <a:r>
+                  <a:rPr lang="ja-JP" altLang="en-US" sz="2400" dirty="0" smtClean="0"/>
+                  <a:t>で</a:t>
+                </a:r>
+                <a:r>
+                  <a:rPr lang="en-US" altLang="ja-JP" sz="2400" dirty="0" smtClean="0"/>
+                  <a:t>Hermitian</a:t>
+                </a:r>
+                <a:r>
+                  <a:rPr lang="ja-JP" altLang="en-US" sz="2400" dirty="0" smtClean="0"/>
+                  <a:t>である。また、固有値は</a:t>
+                </a:r>
+                <a14:m>
+                  <m:oMath xmlns:m="http://schemas.openxmlformats.org/officeDocument/2006/math">
+                    <m:d>
+                      <m:dPr>
+                        <m:begChr m:val="["/>
+                        <m:endChr m:val="]"/>
+                        <m:ctrlPr>
+                          <a:rPr lang="en-US" altLang="ja-JP" sz="2400" i="1" smtClean="0">
+                            <a:latin typeface="Cambria Math" panose="02040503050406030204" pitchFamily="18" charset="0"/>
+                          </a:rPr>
+                        </m:ctrlPr>
+                      </m:dPr>
+                      <m:e>
+                        <m:r>
+                          <a:rPr lang="en-US" altLang="ja-JP" sz="2400" b="0" i="1" smtClean="0">
+                            <a:latin typeface="Cambria Math" panose="02040503050406030204" pitchFamily="18" charset="0"/>
+                          </a:rPr>
+                          <m:t>0,1</m:t>
+                        </m:r>
+                      </m:e>
+                    </m:d>
+                    <m:r>
+                      <a:rPr lang="ja-JP" altLang="en-US" sz="2400" i="1">
+                        <a:latin typeface="Cambria Math" panose="02040503050406030204" pitchFamily="18" charset="0"/>
+                      </a:rPr>
+                      <m:t>でなければならない</m:t>
+                    </m:r>
+                  </m:oMath>
+                </a14:m>
+                <a:r>
+                  <a:rPr lang="ja-JP" altLang="en-US" sz="2400" dirty="0" smtClean="0"/>
+                  <a:t>。</a:t>
+                </a:r>
+                <a:endParaRPr lang="en-US" altLang="ja-JP" sz="2400" dirty="0" smtClean="0"/>
+              </a:p>
+              <a:p>
+                <a:pPr marL="0" indent="0">
+                  <a:buNone/>
+                </a:pPr>
+                <a:r>
+                  <a:rPr lang="ja-JP" altLang="en-US" sz="2400" dirty="0" smtClean="0"/>
+                  <a:t>この</a:t>
+                </a:r>
+                <a:r>
+                  <a:rPr lang="ja-JP" altLang="en-US" sz="2400" dirty="0"/>
+                  <a:t>問題</a:t>
+                </a:r>
+                <a:r>
+                  <a:rPr lang="ja-JP" altLang="en-US" sz="2400" dirty="0" smtClean="0"/>
+                  <a:t>を避けるために最尤推定を使う。手順は以下のとおりである。</a:t>
+                </a:r>
+                <a:endParaRPr lang="en-US" altLang="ja-JP" sz="2400" dirty="0" smtClean="0"/>
+              </a:p>
+              <a:p>
+                <a:pPr marL="514350" indent="-514350">
+                  <a:buFont typeface="+mj-lt"/>
+                  <a:buAutoNum type="romanLcPeriod"/>
+                </a:pPr>
+                <a:r>
+                  <a:rPr lang="ja-JP" altLang="en-US" sz="2400" dirty="0" smtClean="0"/>
+                  <a:t>密度行列の性質を満たす密度行列を生成する。</a:t>
+                </a:r>
+                <a:endParaRPr lang="en-US" altLang="ja-JP" sz="2400" dirty="0" smtClean="0"/>
+              </a:p>
+              <a:p>
+                <a:pPr marL="514350" indent="-514350">
+                  <a:buFont typeface="+mj-lt"/>
+                  <a:buAutoNum type="romanLcPeriod"/>
+                </a:pPr>
+                <a:r>
+                  <a:rPr lang="ja-JP" altLang="en-US" sz="2400" dirty="0" smtClean="0"/>
+                  <a:t>尤度関数を導入する。</a:t>
+                </a:r>
+                <a:endParaRPr lang="en-US" altLang="ja-JP" sz="2400" dirty="0" smtClean="0"/>
+              </a:p>
+              <a:p>
+                <a:pPr marL="514350" indent="-514350">
+                  <a:buFont typeface="+mj-lt"/>
+                  <a:buAutoNum type="romanLcPeriod"/>
+                </a:pPr>
+                <a:r>
+                  <a:rPr lang="en-US" altLang="ja-JP" sz="2400" dirty="0" smtClean="0"/>
+                  <a:t>Iterative</a:t>
+                </a:r>
+                <a:r>
+                  <a:rPr lang="ja-JP" altLang="en-US" sz="2400" dirty="0"/>
+                  <a:t>な</a:t>
+                </a:r>
+                <a:r>
+                  <a:rPr lang="ja-JP" altLang="en-US" sz="2400" dirty="0" smtClean="0"/>
+                  <a:t>アルゴリズムを用いて尤度関数を最大化させる。</a:t>
+                </a:r>
+                <a:endParaRPr lang="en-US" altLang="ja-JP" sz="2400" dirty="0" smtClean="0"/>
+              </a:p>
+            </p:txBody>
+          </p:sp>
+        </mc:Choice>
+        <mc:Fallback xmlns="">
+          <p:sp>
+            <p:nvSpPr>
+              <p:cNvPr id="3" name="コンテンツ プレースホルダー 2"/>
+              <p:cNvSpPr>
+                <a:spLocks noGrp="1" noRot="1" noChangeAspect="1" noMove="1" noResize="1" noEditPoints="1" noAdjustHandles="1" noChangeArrowheads="1" noChangeShapeType="1" noTextEdit="1"/>
+              </p:cNvSpPr>
+              <p:nvPr>
+                <p:ph idx="1"/>
+              </p:nvPr>
+            </p:nvSpPr>
+            <p:spPr>
+              <a:xfrm>
+                <a:off x="838200" y="1215614"/>
+                <a:ext cx="10515600" cy="4961349"/>
+              </a:xfrm>
+              <a:blipFill>
+                <a:blip r:embed="rId2"/>
+                <a:stretch>
+                  <a:fillRect l="-1043" t="-1597" r="-232"/>
+                </a:stretch>
+              </a:blipFill>
+            </p:spPr>
+            <p:txBody>
+              <a:bodyPr/>
+              <a:lstStyle/>
+              <a:p>
+                <a:r>
+                  <a:rPr lang="ja-JP" altLang="en-US">
+                    <a:noFill/>
+                  </a:rPr>
+                  <a:t> </a:t>
+                </a:r>
+              </a:p>
+            </p:txBody>
+          </p:sp>
+        </mc:Fallback>
+      </mc:AlternateContent>
+    </p:spTree>
+    <p:extLst>
+      <p:ext uri="{BB962C8B-B14F-4D97-AF65-F5344CB8AC3E}">
+        <p14:creationId xmlns:p14="http://schemas.microsoft.com/office/powerpoint/2010/main" val="2622380243"/>
       </p:ext>
     </p:extLst>
   </p:cSld>
@@ -19050,7 +19134,13 @@
                             <a:rPr lang="en-US" altLang="ja-JP" sz="2400" b="0" i="1" smtClean="0">
                               <a:latin typeface="Cambria Math" panose="02040503050406030204" pitchFamily="18" charset="0"/>
                             </a:rPr>
-                            <m:t>−1</m:t>
+                            <m:t>−</m:t>
+                          </m:r>
+                          <m:r>
+                            <a:rPr lang="en-US" altLang="ja-JP" sz="2400" b="0" i="1" smtClean="0">
+                              <a:latin typeface="Cambria Math" panose="02040503050406030204" pitchFamily="18" charset="0"/>
+                            </a:rPr>
+                            <m:t>1</m:t>
                           </m:r>
                         </m:sub>
                       </m:sSub>
@@ -19126,7 +19216,19 @@
                                         <a:rPr lang="en-US" altLang="ja-JP" sz="2400" i="1">
                                           <a:latin typeface="Cambria Math" panose="02040503050406030204" pitchFamily="18" charset="0"/>
                                         </a:rPr>
-                                        <m:t>−1 </m:t>
+                                        <m:t>−</m:t>
+                                      </m:r>
+                                      <m:r>
+                                        <a:rPr lang="en-US" altLang="ja-JP" sz="2400" i="1">
+                                          <a:latin typeface="Cambria Math" panose="02040503050406030204" pitchFamily="18" charset="0"/>
+                                        </a:rPr>
+                                        <m:t>1</m:t>
+                                      </m:r>
+                                      <m:r>
+                                        <a:rPr lang="en-US" altLang="ja-JP" sz="2400" i="1">
+                                          <a:latin typeface="Cambria Math" panose="02040503050406030204" pitchFamily="18" charset="0"/>
+                                        </a:rPr>
+                                        <m:t> </m:t>
                                       </m:r>
                                       <m:r>
                                         <a:rPr lang="en-US" altLang="ja-JP" sz="2400" i="1">
@@ -19243,7 +19345,19 @@
                                 <a:rPr lang="en-US" altLang="ja-JP" sz="2400" i="1">
                                   <a:latin typeface="Cambria Math" panose="02040503050406030204" pitchFamily="18" charset="0"/>
                                 </a:rPr>
-                                <m:t>−1 </m:t>
+                                <m:t>−</m:t>
+                              </m:r>
+                              <m:r>
+                                <a:rPr lang="en-US" altLang="ja-JP" sz="2400" i="1">
+                                  <a:latin typeface="Cambria Math" panose="02040503050406030204" pitchFamily="18" charset="0"/>
+                                </a:rPr>
+                                <m:t>1</m:t>
+                              </m:r>
+                              <m:r>
+                                <a:rPr lang="en-US" altLang="ja-JP" sz="2400" i="1">
+                                  <a:latin typeface="Cambria Math" panose="02040503050406030204" pitchFamily="18" charset="0"/>
+                                </a:rPr>
+                                <m:t> </m:t>
                               </m:r>
                               <m:r>
                                 <a:rPr lang="en-US" altLang="ja-JP" sz="2400" i="1">
@@ -19381,7 +19495,13 @@
                             <a:rPr lang="en-US" altLang="ja-JP" sz="2400" i="1">
                               <a:latin typeface="Cambria Math" panose="02040503050406030204" pitchFamily="18" charset="0"/>
                             </a:rPr>
-                            <m:t>−2</m:t>
+                            <m:t>−</m:t>
+                          </m:r>
+                          <m:r>
+                            <a:rPr lang="en-US" altLang="ja-JP" sz="2400" i="1">
+                              <a:latin typeface="Cambria Math" panose="02040503050406030204" pitchFamily="18" charset="0"/>
+                            </a:rPr>
+                            <m:t>2</m:t>
                           </m:r>
                         </m:sub>
                       </m:sSub>
@@ -19457,7 +19577,19 @@
                                         <a:rPr lang="en-US" altLang="ja-JP" sz="2400" i="1">
                                           <a:latin typeface="Cambria Math" panose="02040503050406030204" pitchFamily="18" charset="0"/>
                                         </a:rPr>
-                                        <m:t>−2 </m:t>
+                                        <m:t>−</m:t>
+                                      </m:r>
+                                      <m:r>
+                                        <a:rPr lang="en-US" altLang="ja-JP" sz="2400" i="1">
+                                          <a:latin typeface="Cambria Math" panose="02040503050406030204" pitchFamily="18" charset="0"/>
+                                        </a:rPr>
+                                        <m:t>2</m:t>
+                                      </m:r>
+                                      <m:r>
+                                        <a:rPr lang="en-US" altLang="ja-JP" sz="2400" i="1">
+                                          <a:latin typeface="Cambria Math" panose="02040503050406030204" pitchFamily="18" charset="0"/>
+                                        </a:rPr>
+                                        <m:t> </m:t>
                                       </m:r>
                                       <m:r>
                                         <a:rPr lang="en-US" altLang="ja-JP" sz="2400" i="1">
@@ -19574,7 +19706,19 @@
                                 <a:rPr lang="en-US" altLang="ja-JP" sz="2400" i="1">
                                   <a:latin typeface="Cambria Math" panose="02040503050406030204" pitchFamily="18" charset="0"/>
                                 </a:rPr>
-                                <m:t>−1 </m:t>
+                                <m:t>−</m:t>
+                              </m:r>
+                              <m:r>
+                                <a:rPr lang="en-US" altLang="ja-JP" sz="2400" i="1">
+                                  <a:latin typeface="Cambria Math" panose="02040503050406030204" pitchFamily="18" charset="0"/>
+                                </a:rPr>
+                                <m:t>1</m:t>
+                              </m:r>
+                              <m:r>
+                                <a:rPr lang="en-US" altLang="ja-JP" sz="2400" i="1">
+                                  <a:latin typeface="Cambria Math" panose="02040503050406030204" pitchFamily="18" charset="0"/>
+                                </a:rPr>
+                                <m:t> </m:t>
                               </m:r>
                               <m:r>
                                 <a:rPr lang="en-US" altLang="ja-JP" sz="2400" i="1">
@@ -19903,7 +20047,13 @@
                                 <a:rPr lang="en-US" altLang="ja-JP" sz="2400" i="1">
                                   <a:latin typeface="Cambria Math" panose="02040503050406030204" pitchFamily="18" charset="0"/>
                                 </a:rPr>
-                                <m:t>1 </m:t>
+                                <m:t>1</m:t>
+                              </m:r>
+                              <m:r>
+                                <a:rPr lang="en-US" altLang="ja-JP" sz="2400" i="1">
+                                  <a:latin typeface="Cambria Math" panose="02040503050406030204" pitchFamily="18" charset="0"/>
+                                </a:rPr>
+                                <m:t> </m:t>
                               </m:r>
                               <m:r>
                                 <a:rPr lang="en-US" altLang="ja-JP" sz="2400" i="1">
@@ -20029,7 +20179,19 @@
                             <a:rPr lang="en-US" altLang="ja-JP" sz="2400" b="0" i="1" smtClean="0">
                               <a:latin typeface="Cambria Math" panose="02040503050406030204" pitchFamily="18" charset="0"/>
                             </a:rPr>
-                            <m:t>−1 </m:t>
+                            <m:t>−</m:t>
+                          </m:r>
+                          <m:r>
+                            <a:rPr lang="en-US" altLang="ja-JP" sz="2400" b="0" i="1" smtClean="0">
+                              <a:latin typeface="Cambria Math" panose="02040503050406030204" pitchFamily="18" charset="0"/>
+                            </a:rPr>
+                            <m:t>1</m:t>
+                          </m:r>
+                          <m:r>
+                            <a:rPr lang="en-US" altLang="ja-JP" sz="2400" b="0" i="1" smtClean="0">
+                              <a:latin typeface="Cambria Math" panose="02040503050406030204" pitchFamily="18" charset="0"/>
+                            </a:rPr>
+                            <m:t> </m:t>
                           </m:r>
                           <m:r>
                             <a:rPr lang="en-US" altLang="ja-JP" sz="2400" i="1">
@@ -20041,7 +20203,13 @@
                             <a:rPr lang="en-US" altLang="ja-JP" sz="2400" b="0" i="1" smtClean="0">
                               <a:latin typeface="Cambria Math" panose="02040503050406030204" pitchFamily="18" charset="0"/>
                             </a:rPr>
-                            <m:t>−1</m:t>
+                            <m:t>−</m:t>
+                          </m:r>
+                          <m:r>
+                            <a:rPr lang="en-US" altLang="ja-JP" sz="2400" b="0" i="1" smtClean="0">
+                              <a:latin typeface="Cambria Math" panose="02040503050406030204" pitchFamily="18" charset="0"/>
+                            </a:rPr>
+                            <m:t>1</m:t>
                           </m:r>
                         </m:sub>
                       </m:sSub>
@@ -20101,7 +20269,19 @@
                                 <a:rPr lang="en-US" altLang="ja-JP" sz="2400" b="0" i="1" smtClean="0">
                                   <a:latin typeface="Cambria Math" panose="02040503050406030204" pitchFamily="18" charset="0"/>
                                 </a:rPr>
-                                <m:t>−1 </m:t>
+                                <m:t>−</m:t>
+                              </m:r>
+                              <m:r>
+                                <a:rPr lang="en-US" altLang="ja-JP" sz="2400" b="0" i="1" smtClean="0">
+                                  <a:latin typeface="Cambria Math" panose="02040503050406030204" pitchFamily="18" charset="0"/>
+                                </a:rPr>
+                                <m:t>1</m:t>
+                              </m:r>
+                              <m:r>
+                                <a:rPr lang="en-US" altLang="ja-JP" sz="2400" b="0" i="1" smtClean="0">
+                                  <a:latin typeface="Cambria Math" panose="02040503050406030204" pitchFamily="18" charset="0"/>
+                                </a:rPr>
+                                <m:t> </m:t>
                               </m:r>
                               <m:r>
                                 <a:rPr lang="en-US" altLang="ja-JP" sz="2400" i="1">
@@ -20113,7 +20293,13 @@
                                 <a:rPr lang="en-US" altLang="ja-JP" sz="2400" b="0" i="1" smtClean="0">
                                   <a:latin typeface="Cambria Math" panose="02040503050406030204" pitchFamily="18" charset="0"/>
                                 </a:rPr>
-                                <m:t>−1</m:t>
+                                <m:t>−</m:t>
+                              </m:r>
+                              <m:r>
+                                <a:rPr lang="en-US" altLang="ja-JP" sz="2400" b="0" i="1" smtClean="0">
+                                  <a:latin typeface="Cambria Math" panose="02040503050406030204" pitchFamily="18" charset="0"/>
+                                </a:rPr>
+                                <m:t>1</m:t>
                               </m:r>
                             </m:sub>
                           </m:sSub>
@@ -20194,7 +20380,13 @@
                                         <a:rPr lang="en-US" altLang="ja-JP" sz="2400" i="1">
                                           <a:latin typeface="Cambria Math" panose="02040503050406030204" pitchFamily="18" charset="0"/>
                                         </a:rPr>
-                                        <m:t>−1</m:t>
+                                        <m:t>−</m:t>
+                                      </m:r>
+                                      <m:r>
+                                        <a:rPr lang="en-US" altLang="ja-JP" sz="2400" i="1">
+                                          <a:latin typeface="Cambria Math" panose="02040503050406030204" pitchFamily="18" charset="0"/>
+                                        </a:rPr>
+                                        <m:t>1</m:t>
                                       </m:r>
                                     </m:sub>
                                   </m:sSub>
@@ -20268,7 +20460,19 @@
                                 <a:rPr lang="en-US" altLang="ja-JP" sz="2400" i="1">
                                   <a:latin typeface="Cambria Math" panose="02040503050406030204" pitchFamily="18" charset="0"/>
                                 </a:rPr>
-                                <m:t>−1 </m:t>
+                                <m:t>−</m:t>
+                              </m:r>
+                              <m:r>
+                                <a:rPr lang="en-US" altLang="ja-JP" sz="2400" i="1">
+                                  <a:latin typeface="Cambria Math" panose="02040503050406030204" pitchFamily="18" charset="0"/>
+                                </a:rPr>
+                                <m:t>1</m:t>
+                              </m:r>
+                              <m:r>
+                                <a:rPr lang="en-US" altLang="ja-JP" sz="2400" i="1">
+                                  <a:latin typeface="Cambria Math" panose="02040503050406030204" pitchFamily="18" charset="0"/>
+                                </a:rPr>
+                                <m:t> </m:t>
                               </m:r>
                               <m:r>
                                 <a:rPr lang="en-US" altLang="ja-JP" sz="2400" i="1">
@@ -20280,7 +20484,13 @@
                                 <a:rPr lang="en-US" altLang="ja-JP" sz="2400" i="1">
                                   <a:latin typeface="Cambria Math" panose="02040503050406030204" pitchFamily="18" charset="0"/>
                                 </a:rPr>
-                                <m:t>−1</m:t>
+                                <m:t>−</m:t>
+                              </m:r>
+                              <m:r>
+                                <a:rPr lang="en-US" altLang="ja-JP" sz="2400" i="1">
+                                  <a:latin typeface="Cambria Math" panose="02040503050406030204" pitchFamily="18" charset="0"/>
+                                </a:rPr>
+                                <m:t>1</m:t>
                               </m:r>
                             </m:sub>
                           </m:sSub>
@@ -20356,7 +20566,19 @@
                                             <a:rPr lang="en-US" altLang="ja-JP" sz="2400" i="1">
                                               <a:latin typeface="Cambria Math" panose="02040503050406030204" pitchFamily="18" charset="0"/>
                                             </a:rPr>
-                                            <m:t>−1 </m:t>
+                                            <m:t>−</m:t>
+                                          </m:r>
+                                          <m:r>
+                                            <a:rPr lang="en-US" altLang="ja-JP" sz="2400" i="1">
+                                              <a:latin typeface="Cambria Math" panose="02040503050406030204" pitchFamily="18" charset="0"/>
+                                            </a:rPr>
+                                            <m:t>1</m:t>
+                                          </m:r>
+                                          <m:r>
+                                            <a:rPr lang="en-US" altLang="ja-JP" sz="2400" i="1">
+                                              <a:latin typeface="Cambria Math" panose="02040503050406030204" pitchFamily="18" charset="0"/>
+                                            </a:rPr>
+                                            <m:t> </m:t>
                                           </m:r>
                                           <m:r>
                                             <a:rPr lang="en-US" altLang="ja-JP" sz="2400" i="1">
@@ -20483,19 +20705,37 @@
                             <a:rPr lang="en-US" altLang="ja-JP" sz="2400" i="1">
                               <a:latin typeface="Cambria Math" panose="02040503050406030204" pitchFamily="18" charset="0"/>
                             </a:rPr>
-                            <m:t>−1 </m:t>
+                            <m:t>−</m:t>
                           </m:r>
                           <m:r>
                             <a:rPr lang="en-US" altLang="ja-JP" sz="2400" i="1">
                               <a:latin typeface="Cambria Math" panose="02040503050406030204" pitchFamily="18" charset="0"/>
                             </a:rPr>
+                            <m:t>1</m:t>
+                          </m:r>
+                          <m:r>
+                            <a:rPr lang="en-US" altLang="ja-JP" sz="2400" i="1">
+                              <a:latin typeface="Cambria Math" panose="02040503050406030204" pitchFamily="18" charset="0"/>
+                            </a:rPr>
+                            <m:t> </m:t>
+                          </m:r>
+                          <m:r>
+                            <a:rPr lang="en-US" altLang="ja-JP" sz="2400" i="1">
+                              <a:latin typeface="Cambria Math" panose="02040503050406030204" pitchFamily="18" charset="0"/>
+                            </a:rPr>
                             <m:t>𝑑</m:t>
                           </m:r>
                           <m:r>
                             <a:rPr lang="en-US" altLang="ja-JP" sz="2400" i="1">
                               <a:latin typeface="Cambria Math" panose="02040503050406030204" pitchFamily="18" charset="0"/>
                             </a:rPr>
-                            <m:t>−2</m:t>
+                            <m:t>−</m:t>
+                          </m:r>
+                          <m:r>
+                            <a:rPr lang="en-US" altLang="ja-JP" sz="2400" i="1">
+                              <a:latin typeface="Cambria Math" panose="02040503050406030204" pitchFamily="18" charset="0"/>
+                            </a:rPr>
+                            <m:t>2</m:t>
                           </m:r>
                         </m:sub>
                       </m:sSub>
@@ -20571,7 +20811,19 @@
                                         <a:rPr lang="en-US" altLang="ja-JP" sz="2400" i="1">
                                           <a:latin typeface="Cambria Math" panose="02040503050406030204" pitchFamily="18" charset="0"/>
                                         </a:rPr>
-                                        <m:t>−2 </m:t>
+                                        <m:t>−</m:t>
+                                      </m:r>
+                                      <m:r>
+                                        <a:rPr lang="en-US" altLang="ja-JP" sz="2400" i="1">
+                                          <a:latin typeface="Cambria Math" panose="02040503050406030204" pitchFamily="18" charset="0"/>
+                                        </a:rPr>
+                                        <m:t>2</m:t>
+                                      </m:r>
+                                      <m:r>
+                                        <a:rPr lang="en-US" altLang="ja-JP" sz="2400" i="1">
+                                          <a:latin typeface="Cambria Math" panose="02040503050406030204" pitchFamily="18" charset="0"/>
+                                        </a:rPr>
+                                        <m:t> </m:t>
                                       </m:r>
                                       <m:r>
                                         <a:rPr lang="en-US" altLang="ja-JP" sz="2400" i="1">
@@ -20583,7 +20835,13 @@
                                         <a:rPr lang="en-US" altLang="ja-JP" sz="2400" b="0" i="1" smtClean="0">
                                           <a:latin typeface="Cambria Math" panose="02040503050406030204" pitchFamily="18" charset="0"/>
                                         </a:rPr>
-                                        <m:t>−1</m:t>
+                                        <m:t>−</m:t>
+                                      </m:r>
+                                      <m:r>
+                                        <a:rPr lang="en-US" altLang="ja-JP" sz="2400" b="0" i="1" smtClean="0">
+                                          <a:latin typeface="Cambria Math" panose="02040503050406030204" pitchFamily="18" charset="0"/>
+                                        </a:rPr>
+                                        <m:t>1</m:t>
                                       </m:r>
                                     </m:sub>
                                   </m:sSub>
@@ -20644,7 +20902,13 @@
                                         <a:rPr lang="en-US" altLang="ja-JP" sz="2400" b="0" i="1" smtClean="0">
                                           <a:latin typeface="Cambria Math" panose="02040503050406030204" pitchFamily="18" charset="0"/>
                                         </a:rPr>
-                                        <m:t>−2</m:t>
+                                        <m:t>−</m:t>
+                                      </m:r>
+                                      <m:r>
+                                        <a:rPr lang="en-US" altLang="ja-JP" sz="2400" b="0" i="1" smtClean="0">
+                                          <a:latin typeface="Cambria Math" panose="02040503050406030204" pitchFamily="18" charset="0"/>
+                                        </a:rPr>
+                                        <m:t>2</m:t>
                                       </m:r>
                                     </m:sub>
                                     <m:sup>
@@ -20707,7 +20971,13 @@
                                         <a:rPr lang="en-US" altLang="ja-JP" sz="2400" b="0" i="1" smtClean="0">
                                           <a:latin typeface="Cambria Math" panose="02040503050406030204" pitchFamily="18" charset="0"/>
                                         </a:rPr>
-                                        <m:t>−1</m:t>
+                                        <m:t>−</m:t>
+                                      </m:r>
+                                      <m:r>
+                                        <a:rPr lang="en-US" altLang="ja-JP" sz="2400" b="0" i="1" smtClean="0">
+                                          <a:latin typeface="Cambria Math" panose="02040503050406030204" pitchFamily="18" charset="0"/>
+                                        </a:rPr>
+                                        <m:t>1</m:t>
                                       </m:r>
                                     </m:sub>
                                   </m:sSub>
@@ -20752,7 +21022,19 @@
                                         <a:rPr lang="en-US" altLang="ja-JP" sz="2400" b="0" i="1" smtClean="0">
                                           <a:latin typeface="Cambria Math" panose="02040503050406030204" pitchFamily="18" charset="0"/>
                                         </a:rPr>
-                                        <m:t>−1 </m:t>
+                                        <m:t>−</m:t>
+                                      </m:r>
+                                      <m:r>
+                                        <a:rPr lang="en-US" altLang="ja-JP" sz="2400" b="0" i="1" smtClean="0">
+                                          <a:latin typeface="Cambria Math" panose="02040503050406030204" pitchFamily="18" charset="0"/>
+                                        </a:rPr>
+                                        <m:t>1</m:t>
+                                      </m:r>
+                                      <m:r>
+                                        <a:rPr lang="en-US" altLang="ja-JP" sz="2400" b="0" i="1" smtClean="0">
+                                          <a:latin typeface="Cambria Math" panose="02040503050406030204" pitchFamily="18" charset="0"/>
+                                        </a:rPr>
+                                        <m:t> </m:t>
                                       </m:r>
                                       <m:r>
                                         <a:rPr lang="en-US" altLang="ja-JP" sz="2400" i="1">
@@ -20764,7 +21046,13 @@
                                         <a:rPr lang="en-US" altLang="ja-JP" sz="2400" b="0" i="1" smtClean="0">
                                           <a:latin typeface="Cambria Math" panose="02040503050406030204" pitchFamily="18" charset="0"/>
                                         </a:rPr>
-                                        <m:t>−1</m:t>
+                                        <m:t>−</m:t>
+                                      </m:r>
+                                      <m:r>
+                                        <a:rPr lang="en-US" altLang="ja-JP" sz="2400" b="0" i="1" smtClean="0">
+                                          <a:latin typeface="Cambria Math" panose="02040503050406030204" pitchFamily="18" charset="0"/>
+                                        </a:rPr>
+                                        <m:t>1</m:t>
                                       </m:r>
                                     </m:sub>
                                   </m:sSub>
@@ -20854,7 +21142,19 @@
                                         <a:rPr lang="en-US" altLang="ja-JP" sz="2400" i="1">
                                           <a:latin typeface="Cambria Math" panose="02040503050406030204" pitchFamily="18" charset="0"/>
                                         </a:rPr>
-                                        <m:t>−2 </m:t>
+                                        <m:t>−</m:t>
+                                      </m:r>
+                                      <m:r>
+                                        <a:rPr lang="en-US" altLang="ja-JP" sz="2400" i="1">
+                                          <a:latin typeface="Cambria Math" panose="02040503050406030204" pitchFamily="18" charset="0"/>
+                                        </a:rPr>
+                                        <m:t>2</m:t>
+                                      </m:r>
+                                      <m:r>
+                                        <a:rPr lang="en-US" altLang="ja-JP" sz="2400" i="1">
+                                          <a:latin typeface="Cambria Math" panose="02040503050406030204" pitchFamily="18" charset="0"/>
+                                        </a:rPr>
+                                        <m:t> </m:t>
                                       </m:r>
                                       <m:r>
                                         <a:rPr lang="en-US" altLang="ja-JP" sz="2400" i="1">
@@ -20866,7 +21166,13 @@
                                         <a:rPr lang="en-US" altLang="ja-JP" sz="2400" i="1">
                                           <a:latin typeface="Cambria Math" panose="02040503050406030204" pitchFamily="18" charset="0"/>
                                         </a:rPr>
-                                        <m:t>−1</m:t>
+                                        <m:t>−</m:t>
+                                      </m:r>
+                                      <m:r>
+                                        <a:rPr lang="en-US" altLang="ja-JP" sz="2400" i="1">
+                                          <a:latin typeface="Cambria Math" panose="02040503050406030204" pitchFamily="18" charset="0"/>
+                                        </a:rPr>
+                                        <m:t>1</m:t>
                                       </m:r>
                                     </m:sub>
                                   </m:sSub>
@@ -20924,7 +21230,19 @@
                                             <a:rPr lang="en-US" altLang="ja-JP" sz="2400" i="1">
                                               <a:latin typeface="Cambria Math" panose="02040503050406030204" pitchFamily="18" charset="0"/>
                                             </a:rPr>
-                                            <m:t>−2 </m:t>
+                                            <m:t>−</m:t>
+                                          </m:r>
+                                          <m:r>
+                                            <a:rPr lang="en-US" altLang="ja-JP" sz="2400" i="1">
+                                              <a:latin typeface="Cambria Math" panose="02040503050406030204" pitchFamily="18" charset="0"/>
+                                            </a:rPr>
+                                            <m:t>2</m:t>
+                                          </m:r>
+                                          <m:r>
+                                            <a:rPr lang="en-US" altLang="ja-JP" sz="2400" i="1">
+                                              <a:latin typeface="Cambria Math" panose="02040503050406030204" pitchFamily="18" charset="0"/>
+                                            </a:rPr>
+                                            <m:t> </m:t>
                                           </m:r>
                                           <m:r>
                                             <a:rPr lang="en-US" altLang="ja-JP" sz="2400" i="1">
@@ -21036,7 +21354,19 @@
                                             <a:rPr lang="en-US" altLang="ja-JP" sz="2400" i="1">
                                               <a:latin typeface="Cambria Math" panose="02040503050406030204" pitchFamily="18" charset="0"/>
                                             </a:rPr>
-                                            <m:t>−1 </m:t>
+                                            <m:t>−</m:t>
+                                          </m:r>
+                                          <m:r>
+                                            <a:rPr lang="en-US" altLang="ja-JP" sz="2400" i="1">
+                                              <a:latin typeface="Cambria Math" panose="02040503050406030204" pitchFamily="18" charset="0"/>
+                                            </a:rPr>
+                                            <m:t>1</m:t>
+                                          </m:r>
+                                          <m:r>
+                                            <a:rPr lang="en-US" altLang="ja-JP" sz="2400" i="1">
+                                              <a:latin typeface="Cambria Math" panose="02040503050406030204" pitchFamily="18" charset="0"/>
+                                            </a:rPr>
+                                            <m:t> </m:t>
                                           </m:r>
                                           <m:r>
                                             <a:rPr lang="en-US" altLang="ja-JP" sz="2400" i="1">
@@ -21160,7 +21490,19 @@
                                             <a:rPr lang="en-US" altLang="ja-JP" sz="2400" i="1">
                                               <a:latin typeface="Cambria Math" panose="02040503050406030204" pitchFamily="18" charset="0"/>
                                             </a:rPr>
-                                            <m:t>−1 </m:t>
+                                            <m:t>−</m:t>
+                                          </m:r>
+                                          <m:r>
+                                            <a:rPr lang="en-US" altLang="ja-JP" sz="2400" i="1">
+                                              <a:latin typeface="Cambria Math" panose="02040503050406030204" pitchFamily="18" charset="0"/>
+                                            </a:rPr>
+                                            <m:t>1</m:t>
+                                          </m:r>
+                                          <m:r>
+                                            <a:rPr lang="en-US" altLang="ja-JP" sz="2400" i="1">
+                                              <a:latin typeface="Cambria Math" panose="02040503050406030204" pitchFamily="18" charset="0"/>
+                                            </a:rPr>
+                                            <m:t> </m:t>
                                           </m:r>
                                           <m:r>
                                             <a:rPr lang="en-US" altLang="ja-JP" sz="2400" i="1">
@@ -21172,7 +21514,13 @@
                                             <a:rPr lang="en-US" altLang="ja-JP" sz="2400" i="1">
                                               <a:latin typeface="Cambria Math" panose="02040503050406030204" pitchFamily="18" charset="0"/>
                                             </a:rPr>
-                                            <m:t>−1</m:t>
+                                            <m:t>−</m:t>
+                                          </m:r>
+                                          <m:r>
+                                            <a:rPr lang="en-US" altLang="ja-JP" sz="2400" i="1">
+                                              <a:latin typeface="Cambria Math" panose="02040503050406030204" pitchFamily="18" charset="0"/>
+                                            </a:rPr>
+                                            <m:t>1</m:t>
                                           </m:r>
                                         </m:sub>
                                       </m:sSub>
@@ -21248,7 +21596,19 @@
                                                         <a:rPr lang="en-US" altLang="ja-JP" sz="2400" i="1">
                                                           <a:latin typeface="Cambria Math" panose="02040503050406030204" pitchFamily="18" charset="0"/>
                                                         </a:rPr>
-                                                        <m:t>−1 </m:t>
+                                                        <m:t>−</m:t>
+                                                      </m:r>
+                                                      <m:r>
+                                                        <a:rPr lang="en-US" altLang="ja-JP" sz="2400" i="1">
+                                                          <a:latin typeface="Cambria Math" panose="02040503050406030204" pitchFamily="18" charset="0"/>
+                                                        </a:rPr>
+                                                        <m:t>1</m:t>
+                                                      </m:r>
+                                                      <m:r>
+                                                        <a:rPr lang="en-US" altLang="ja-JP" sz="2400" i="1">
+                                                          <a:latin typeface="Cambria Math" panose="02040503050406030204" pitchFamily="18" charset="0"/>
+                                                        </a:rPr>
+                                                        <m:t> </m:t>
                                                       </m:r>
                                                       <m:r>
                                                         <a:rPr lang="en-US" altLang="ja-JP" sz="2400" i="1">
@@ -22520,13 +22880,7 @@
                   <a:rPr lang="ja-JP" altLang="en-US" sz="2400" dirty="0" smtClean="0">
                     <a:latin typeface="+mn-ea"/>
                   </a:rPr>
-                  <a:t>で得られる</a:t>
-                </a:r>
-                <a:r>
-                  <a:rPr lang="ja-JP" altLang="en-US" sz="2400" dirty="0" smtClean="0">
-                    <a:latin typeface="+mn-ea"/>
-                  </a:rPr>
-                  <a:t>。</a:t>
+                  <a:t>で得られる。</a:t>
                 </a:r>
                 <a14:m>
                   <m:oMath xmlns:m="http://schemas.openxmlformats.org/officeDocument/2006/math">
@@ -22664,39 +23018,67 @@
                   <a:rPr lang="ja-JP" altLang="en-US" sz="2400" dirty="0" smtClean="0">
                     <a:latin typeface="Lucida Calligraphy" panose="03010101010101010101" pitchFamily="66" charset="0"/>
                   </a:rPr>
-                  <a:t>最終的な目標はこの尤度関数を最大化させる密度行列</a:t>
+                  <a:t>最終的な目標はこの尤度関数を最大化させる密度</a:t>
+                </a:r>
+                <a:r>
+                  <a:rPr lang="ja-JP" altLang="en-US" sz="2400" dirty="0" smtClean="0">
+                    <a:latin typeface="Lucida Calligraphy" panose="03010101010101010101" pitchFamily="66" charset="0"/>
+                  </a:rPr>
+                  <a:t>行列</a:t>
                 </a:r>
                 <a14:m>
                   <m:oMath xmlns:m="http://schemas.openxmlformats.org/officeDocument/2006/math">
-                    <m:acc>
-                      <m:accPr>
-                        <m:chr m:val="̂"/>
+                    <m:sSub>
+                      <m:sSubPr>
                         <m:ctrlPr>
-                          <a:rPr lang="ja-JP" altLang="en-US" sz="2400" i="1">
+                          <a:rPr lang="en-US" altLang="ja-JP" sz="2400" i="1" smtClean="0">
                             <a:latin typeface="Cambria Math" panose="02040503050406030204" pitchFamily="18" charset="0"/>
                           </a:rPr>
                         </m:ctrlPr>
-                      </m:accPr>
+                      </m:sSubPr>
                       <m:e>
+                        <m:acc>
+                          <m:accPr>
+                            <m:chr m:val="̂"/>
+                            <m:ctrlPr>
+                              <a:rPr lang="ja-JP" altLang="en-US" sz="2400" i="1">
+                                <a:latin typeface="Cambria Math" panose="02040503050406030204" pitchFamily="18" charset="0"/>
+                              </a:rPr>
+                            </m:ctrlPr>
+                          </m:accPr>
+                          <m:e>
+                            <m:r>
+                              <a:rPr lang="ja-JP" altLang="en-US" sz="2400" i="1">
+                                <a:latin typeface="Cambria Math" panose="02040503050406030204" pitchFamily="18" charset="0"/>
+                              </a:rPr>
+                              <m:t>𝜌</m:t>
+                            </m:r>
+                          </m:e>
+                        </m:acc>
+                      </m:e>
+                      <m:sub>
                         <m:r>
-                          <a:rPr lang="ja-JP" altLang="en-US" sz="2400" i="1">
+                          <a:rPr lang="en-US" altLang="ja-JP" sz="2400" b="0" i="1" smtClean="0">
                             <a:latin typeface="Cambria Math" panose="02040503050406030204" pitchFamily="18" charset="0"/>
                           </a:rPr>
-                          <m:t>𝜌</m:t>
+                          <m:t>0</m:t>
                         </m:r>
-                      </m:e>
-                    </m:acc>
+                      </m:sub>
+                    </m:sSub>
                   </m:oMath>
                 </a14:m>
                 <a:r>
                   <a:rPr lang="ja-JP" altLang="en-US" sz="2400" dirty="0" smtClean="0">
                     <a:latin typeface="Lucida Calligraphy" panose="03010101010101010101" pitchFamily="66" charset="0"/>
                   </a:rPr>
-                  <a:t>を見つけることである。</a:t>
+                  <a:t>を見つけることである</a:t>
                 </a:r>
-                <a:endParaRPr lang="en-US" altLang="ja-JP" sz="2400" dirty="0" smtClean="0">
-                  <a:latin typeface="Lucida Calligraphy" panose="03010101010101010101" pitchFamily="66" charset="0"/>
-                </a:endParaRPr>
+                <a:r>
+                  <a:rPr lang="ja-JP" altLang="en-US" sz="2400" dirty="0" smtClean="0">
+                    <a:latin typeface="Lucida Calligraphy" panose="03010101010101010101" pitchFamily="66" charset="0"/>
+                  </a:rPr>
+                  <a:t>。</a:t>
+                </a:r>
               </a:p>
               <a:p>
                 <a:pPr marL="0" indent="0">
@@ -22706,235 +23088,106 @@
                   <a:rPr lang="ja-JP" altLang="en-US" sz="2400" dirty="0" smtClean="0">
                     <a:latin typeface="Lucida Calligraphy" panose="03010101010101010101" pitchFamily="66" charset="0"/>
                   </a:rPr>
-                  <a:t>また、対数で考えて</a:t>
+                  <a:t>ここで相対頻度を</a:t>
                 </a:r>
-                <a:r>
-                  <a:rPr lang="ja-JP" altLang="en-US" sz="2400" dirty="0">
-                    <a:latin typeface="+mn-ea"/>
-                  </a:rPr>
-                  <a:t>良</a:t>
-                </a:r>
-                <a:r>
-                  <a:rPr lang="ja-JP" altLang="en-US" sz="2400" dirty="0" smtClean="0">
-                    <a:latin typeface="+mn-ea"/>
-                  </a:rPr>
-                  <a:t>い</a:t>
-                </a:r>
+                <a14:m>
+                  <m:oMath xmlns:m="http://schemas.openxmlformats.org/officeDocument/2006/math">
+                    <m:sSub>
+                      <m:sSubPr>
+                        <m:ctrlPr>
+                          <a:rPr lang="en-US" altLang="ja-JP" sz="2400" i="1" smtClean="0">
+                            <a:latin typeface="Cambria Math" panose="02040503050406030204" pitchFamily="18" charset="0"/>
+                          </a:rPr>
+                        </m:ctrlPr>
+                      </m:sSubPr>
+                      <m:e>
+                        <m:acc>
+                          <m:accPr>
+                            <m:chr m:val="̃"/>
+                            <m:ctrlPr>
+                              <a:rPr lang="en-US" altLang="ja-JP" sz="2400" i="1" smtClean="0">
+                                <a:latin typeface="Cambria Math" panose="02040503050406030204" pitchFamily="18" charset="0"/>
+                              </a:rPr>
+                            </m:ctrlPr>
+                          </m:accPr>
+                          <m:e>
+                            <m:r>
+                              <a:rPr lang="en-US" altLang="ja-JP" sz="2400" b="0" i="1" smtClean="0">
+                                <a:latin typeface="Cambria Math" panose="02040503050406030204" pitchFamily="18" charset="0"/>
+                              </a:rPr>
+                              <m:t>𝑓</m:t>
+                            </m:r>
+                          </m:e>
+                        </m:acc>
+                      </m:e>
+                      <m:sub>
+                        <m:r>
+                          <a:rPr lang="en-US" altLang="ja-JP" sz="2400" b="0" i="1" smtClean="0">
+                            <a:latin typeface="Cambria Math" panose="02040503050406030204" pitchFamily="18" charset="0"/>
+                          </a:rPr>
+                          <m:t>𝑗</m:t>
+                        </m:r>
+                      </m:sub>
+                    </m:sSub>
+                    <m:r>
+                      <a:rPr lang="en-US" altLang="ja-JP" sz="2400" b="0" i="1" smtClean="0">
+                        <a:latin typeface="Cambria Math" panose="02040503050406030204" pitchFamily="18" charset="0"/>
+                      </a:rPr>
+                      <m:t>=</m:t>
+                    </m:r>
+                    <m:f>
+                      <m:fPr>
+                        <m:ctrlPr>
+                          <a:rPr lang="en-US" altLang="ja-JP" sz="2400" b="0" i="1" smtClean="0">
+                            <a:latin typeface="Cambria Math" panose="02040503050406030204" pitchFamily="18" charset="0"/>
+                          </a:rPr>
+                        </m:ctrlPr>
+                      </m:fPr>
+                      <m:num>
+                        <m:sSub>
+                          <m:sSubPr>
+                            <m:ctrlPr>
+                              <a:rPr lang="en-US" altLang="ja-JP" sz="2400" i="1">
+                                <a:latin typeface="Cambria Math" panose="02040503050406030204" pitchFamily="18" charset="0"/>
+                              </a:rPr>
+                            </m:ctrlPr>
+                          </m:sSubPr>
+                          <m:e>
+                            <m:r>
+                              <a:rPr lang="en-US" altLang="ja-JP" sz="2400" i="1">
+                                <a:latin typeface="Cambria Math" panose="02040503050406030204" pitchFamily="18" charset="0"/>
+                              </a:rPr>
+                              <m:t>𝑓</m:t>
+                            </m:r>
+                          </m:e>
+                          <m:sub>
+                            <m:r>
+                              <a:rPr lang="en-US" altLang="ja-JP" sz="2400" i="1">
+                                <a:latin typeface="Cambria Math" panose="02040503050406030204" pitchFamily="18" charset="0"/>
+                              </a:rPr>
+                              <m:t>𝑗</m:t>
+                            </m:r>
+                          </m:sub>
+                        </m:sSub>
+                      </m:num>
+                      <m:den>
+                        <m:r>
+                          <a:rPr lang="en-US" altLang="ja-JP" sz="2400" b="0" i="1" smtClean="0">
+                            <a:latin typeface="Cambria Math" panose="02040503050406030204" pitchFamily="18" charset="0"/>
+                          </a:rPr>
+                          <m:t>𝑁</m:t>
+                        </m:r>
+                      </m:den>
+                    </m:f>
+                  </m:oMath>
+                </a14:m>
                 <a:r>
                   <a:rPr lang="ja-JP" altLang="en-US" sz="2400" dirty="0" smtClean="0">
                     <a:latin typeface="Lucida Calligraphy" panose="03010101010101010101" pitchFamily="66" charset="0"/>
                   </a:rPr>
-                  <a:t>ので対数尤度関数</a:t>
+                  <a:t>とする。</a:t>
                 </a:r>
                 <a:endParaRPr lang="en-US" altLang="ja-JP" sz="2400" dirty="0" smtClean="0">
-                  <a:latin typeface="Lucida Calligraphy" panose="03010101010101010101" pitchFamily="66" charset="0"/>
-                </a:endParaRPr>
-              </a:p>
-              <a:p>
-                <a:pPr marL="0" indent="0">
-                  <a:buNone/>
-                </a:pPr>
-                <a14:m>
-                  <m:oMathPara xmlns:m="http://schemas.openxmlformats.org/officeDocument/2006/math">
-                    <m:oMathParaPr>
-                      <m:jc m:val="centerGroup"/>
-                    </m:oMathParaPr>
-                    <m:oMath xmlns:m="http://schemas.openxmlformats.org/officeDocument/2006/math">
-                      <m:func>
-                        <m:funcPr>
-                          <m:ctrlPr>
-                            <a:rPr lang="en-US" altLang="ja-JP" sz="2400" i="1" smtClean="0">
-                              <a:latin typeface="Cambria Math" panose="02040503050406030204" pitchFamily="18" charset="0"/>
-                            </a:rPr>
-                          </m:ctrlPr>
-                        </m:funcPr>
-                        <m:fName>
-                          <m:r>
-                            <m:rPr>
-                              <m:sty m:val="p"/>
-                            </m:rPr>
-                            <a:rPr lang="en-US" altLang="ja-JP" sz="2400" i="0" smtClean="0">
-                              <a:latin typeface="Cambria Math" panose="02040503050406030204" pitchFamily="18" charset="0"/>
-                            </a:rPr>
-                            <m:t>log</m:t>
-                          </m:r>
-                        </m:fName>
-                        <m:e>
-                          <m:r>
-                            <m:rPr>
-                              <m:nor/>
-                            </m:rPr>
-                            <a:rPr lang="en-US" altLang="ja-JP" sz="2400" dirty="0">
-                              <a:latin typeface="Lucida Calligraphy" panose="03010101010101010101" pitchFamily="66" charset="0"/>
-                            </a:rPr>
-                            <m:t>L</m:t>
-                          </m:r>
-                          <m:d>
-                            <m:dPr>
-                              <m:ctrlPr>
-                                <a:rPr lang="en-US" altLang="ja-JP" sz="2400" i="1">
-                                  <a:latin typeface="Cambria Math" panose="02040503050406030204" pitchFamily="18" charset="0"/>
-                                </a:rPr>
-                              </m:ctrlPr>
-                            </m:dPr>
-                            <m:e>
-                              <m:acc>
-                                <m:accPr>
-                                  <m:chr m:val="̂"/>
-                                  <m:ctrlPr>
-                                    <a:rPr lang="ja-JP" altLang="en-US" sz="2400" i="1">
-                                      <a:latin typeface="Cambria Math" panose="02040503050406030204" pitchFamily="18" charset="0"/>
-                                    </a:rPr>
-                                  </m:ctrlPr>
-                                </m:accPr>
-                                <m:e>
-                                  <m:r>
-                                    <a:rPr lang="ja-JP" altLang="en-US" sz="2400" i="1">
-                                      <a:latin typeface="Cambria Math" panose="02040503050406030204" pitchFamily="18" charset="0"/>
-                                    </a:rPr>
-                                    <m:t>𝜌</m:t>
-                                  </m:r>
-                                </m:e>
-                              </m:acc>
-                            </m:e>
-                          </m:d>
-                        </m:e>
-                      </m:func>
-                      <m:r>
-                        <a:rPr lang="en-US" altLang="ja-JP" sz="2400" b="0" i="1" smtClean="0">
-                          <a:latin typeface="Cambria Math" panose="02040503050406030204" pitchFamily="18" charset="0"/>
-                        </a:rPr>
-                        <m:t>=</m:t>
-                      </m:r>
-                      <m:nary>
-                        <m:naryPr>
-                          <m:chr m:val="∑"/>
-                          <m:supHide m:val="on"/>
-                          <m:ctrlPr>
-                            <a:rPr lang="en-US" altLang="ja-JP" sz="2400" b="0" i="1" smtClean="0">
-                              <a:latin typeface="Cambria Math" panose="02040503050406030204" pitchFamily="18" charset="0"/>
-                            </a:rPr>
-                          </m:ctrlPr>
-                        </m:naryPr>
-                        <m:sub>
-                          <m:r>
-                            <m:rPr>
-                              <m:brk m:alnAt="7"/>
-                            </m:rPr>
-                            <a:rPr lang="en-US" altLang="ja-JP" sz="2400" b="0" i="1" smtClean="0">
-                              <a:latin typeface="Cambria Math" panose="02040503050406030204" pitchFamily="18" charset="0"/>
-                            </a:rPr>
-                            <m:t>𝑗</m:t>
-                          </m:r>
-                        </m:sub>
-                        <m:sup/>
-                        <m:e>
-                          <m:sSub>
-                            <m:sSubPr>
-                              <m:ctrlPr>
-                                <a:rPr lang="en-US" altLang="ja-JP" sz="2400" i="1">
-                                  <a:latin typeface="Cambria Math" panose="02040503050406030204" pitchFamily="18" charset="0"/>
-                                </a:rPr>
-                              </m:ctrlPr>
-                            </m:sSubPr>
-                            <m:e>
-                              <m:r>
-                                <a:rPr lang="en-US" altLang="ja-JP" sz="2400" i="1">
-                                  <a:latin typeface="Cambria Math" panose="02040503050406030204" pitchFamily="18" charset="0"/>
-                                </a:rPr>
-                                <m:t>𝑓</m:t>
-                              </m:r>
-                            </m:e>
-                            <m:sub>
-                              <m:r>
-                                <a:rPr lang="en-US" altLang="ja-JP" sz="2400" i="1">
-                                  <a:latin typeface="Cambria Math" panose="02040503050406030204" pitchFamily="18" charset="0"/>
-                                </a:rPr>
-                                <m:t>𝑗</m:t>
-                              </m:r>
-                            </m:sub>
-                          </m:sSub>
-                          <m:func>
-                            <m:funcPr>
-                              <m:ctrlPr>
-                                <a:rPr lang="en-US" altLang="ja-JP" sz="2400" i="1" smtClean="0">
-                                  <a:latin typeface="Cambria Math" panose="02040503050406030204" pitchFamily="18" charset="0"/>
-                                </a:rPr>
-                              </m:ctrlPr>
-                            </m:funcPr>
-                            <m:fName>
-                              <m:r>
-                                <m:rPr>
-                                  <m:sty m:val="p"/>
-                                </m:rPr>
-                                <a:rPr lang="en-US" altLang="ja-JP" sz="2400" i="0" smtClean="0">
-                                  <a:latin typeface="Cambria Math" panose="02040503050406030204" pitchFamily="18" charset="0"/>
-                                </a:rPr>
-                                <m:t>log</m:t>
-                              </m:r>
-                            </m:fName>
-                            <m:e>
-                              <m:d>
-                                <m:dPr>
-                                  <m:ctrlPr>
-                                    <a:rPr lang="en-US" altLang="ja-JP" sz="2400" i="1" smtClean="0">
-                                      <a:latin typeface="Cambria Math" panose="02040503050406030204" pitchFamily="18" charset="0"/>
-                                    </a:rPr>
-                                  </m:ctrlPr>
-                                </m:dPr>
-                                <m:e>
-                                  <m:sSub>
-                                    <m:sSubPr>
-                                      <m:ctrlPr>
-                                        <a:rPr lang="en-US" altLang="ja-JP" sz="2400" i="1">
-                                          <a:latin typeface="Cambria Math" panose="02040503050406030204" pitchFamily="18" charset="0"/>
-                                        </a:rPr>
-                                      </m:ctrlPr>
-                                    </m:sSubPr>
-                                    <m:e>
-                                      <m:r>
-                                        <m:rPr>
-                                          <m:sty m:val="p"/>
-                                        </m:rPr>
-                                        <a:rPr lang="en-US" altLang="ja-JP" sz="2400">
-                                          <a:latin typeface="Cambria Math" panose="02040503050406030204" pitchFamily="18" charset="0"/>
-                                        </a:rPr>
-                                        <m:t>Pr</m:t>
-                                      </m:r>
-                                    </m:e>
-                                    <m:sub>
-                                      <m:r>
-                                        <a:rPr lang="en-US" altLang="ja-JP" sz="2400" i="1">
-                                          <a:latin typeface="Cambria Math" panose="02040503050406030204" pitchFamily="18" charset="0"/>
-                                        </a:rPr>
-                                        <m:t>𝑗</m:t>
-                                      </m:r>
-                                    </m:sub>
-                                  </m:sSub>
-                                </m:e>
-                              </m:d>
-                            </m:e>
-                          </m:func>
-                        </m:e>
-                      </m:nary>
-                    </m:oMath>
-                  </m:oMathPara>
-                </a14:m>
-                <a:endParaRPr lang="en-US" altLang="ja-JP" sz="2400" dirty="0" smtClean="0">
-                  <a:latin typeface="Lucida Calligraphy" panose="03010101010101010101" pitchFamily="66" charset="0"/>
-                </a:endParaRPr>
-              </a:p>
-              <a:p>
-                <a:pPr marL="0" indent="0">
-                  <a:buNone/>
-                </a:pPr>
-                <a:r>
-                  <a:rPr lang="ja-JP" altLang="en-US" sz="2400" dirty="0" smtClean="0">
-                    <a:latin typeface="Lucida Calligraphy" panose="03010101010101010101" pitchFamily="66" charset="0"/>
-                  </a:rPr>
-                  <a:t>について考える。</a:t>
-                </a:r>
-                <a:endParaRPr lang="en-US" altLang="ja-JP" sz="2400" dirty="0">
                   <a:latin typeface="Lucida Calligraphy" panose="03010101010101010101" pitchFamily="66" charset="0"/>
                 </a:endParaRPr>
               </a:p>
@@ -23161,35 +23414,1288 @@
           </p:sp>
         </mc:Fallback>
       </mc:AlternateContent>
-      <p:sp>
-        <p:nvSpPr>
-          <p:cNvPr id="3" name="コンテンツ プレースホルダー 2"/>
-          <p:cNvSpPr>
-            <a:spLocks noGrp="1"/>
-          </p:cNvSpPr>
-          <p:nvPr>
-            <p:ph idx="1"/>
-          </p:nvPr>
-        </p:nvSpPr>
-        <p:spPr>
-          <a:xfrm>
-            <a:off x="838200" y="1215614"/>
-            <a:ext cx="10515600" cy="4961349"/>
-          </a:xfrm>
-        </p:spPr>
-        <p:txBody>
-          <a:bodyPr>
-            <a:normAutofit/>
-          </a:bodyPr>
-          <a:lstStyle/>
-          <a:p>
-            <a:pPr marL="0" indent="0">
-              <a:buNone/>
-            </a:pPr>
-            <a:endParaRPr lang="en-US" altLang="ja-JP" sz="2400" dirty="0" smtClean="0"/>
-          </a:p>
-        </p:txBody>
-      </p:sp>
+      <mc:AlternateContent xmlns:mc="http://schemas.openxmlformats.org/markup-compatibility/2006">
+        <mc:Choice xmlns:a14="http://schemas.microsoft.com/office/drawing/2010/main" Requires="a14">
+          <p:sp>
+            <p:nvSpPr>
+              <p:cNvPr id="3" name="コンテンツ プレースホルダー 2"/>
+              <p:cNvSpPr>
+                <a:spLocks noGrp="1"/>
+              </p:cNvSpPr>
+              <p:nvPr>
+                <p:ph idx="1"/>
+              </p:nvPr>
+            </p:nvSpPr>
+            <p:spPr>
+              <a:xfrm>
+                <a:off x="838200" y="1215614"/>
+                <a:ext cx="10515600" cy="4961349"/>
+              </a:xfrm>
+            </p:spPr>
+            <p:txBody>
+              <a:bodyPr>
+                <a:normAutofit/>
+              </a:bodyPr>
+              <a:lstStyle/>
+              <a:p>
+                <a:pPr marL="0" indent="0">
+                  <a:buNone/>
+                </a:pPr>
+                <a:r>
+                  <a:rPr lang="en-US" altLang="ja-JP" sz="2400" dirty="0" smtClean="0"/>
+                  <a:t>Jensen</a:t>
+                </a:r>
+                <a:r>
+                  <a:rPr lang="ja-JP" altLang="en-US" sz="2400" dirty="0" smtClean="0"/>
+                  <a:t>の不等式</a:t>
+                </a:r>
+                <a:endParaRPr lang="en-US" altLang="ja-JP" sz="2400" dirty="0" smtClean="0"/>
+              </a:p>
+              <a:p>
+                <a:pPr marL="0" indent="0">
+                  <a:buNone/>
+                </a:pPr>
+                <a14:m>
+                  <m:oMathPara xmlns:m="http://schemas.openxmlformats.org/officeDocument/2006/math">
+                    <m:oMathParaPr>
+                      <m:jc m:val="centerGroup"/>
+                    </m:oMathParaPr>
+                    <m:oMath xmlns:m="http://schemas.openxmlformats.org/officeDocument/2006/math">
+                      <m:nary>
+                        <m:naryPr>
+                          <m:chr m:val="∏"/>
+                          <m:limLoc m:val="subSup"/>
+                          <m:supHide m:val="on"/>
+                          <m:ctrlPr>
+                            <a:rPr lang="en-US" altLang="ja-JP" sz="2400" i="1" smtClean="0">
+                              <a:latin typeface="Cambria Math" panose="02040503050406030204" pitchFamily="18" charset="0"/>
+                            </a:rPr>
+                          </m:ctrlPr>
+                        </m:naryPr>
+                        <m:sub>
+                          <m:r>
+                            <m:rPr>
+                              <m:brk m:alnAt="9"/>
+                            </m:rPr>
+                            <a:rPr lang="en-US" altLang="ja-JP" sz="2400" b="0" i="1" smtClean="0">
+                              <a:latin typeface="Cambria Math" panose="02040503050406030204" pitchFamily="18" charset="0"/>
+                            </a:rPr>
+                            <m:t>𝑗</m:t>
+                          </m:r>
+                        </m:sub>
+                        <m:sup/>
+                        <m:e>
+                          <m:sSup>
+                            <m:sSupPr>
+                              <m:ctrlPr>
+                                <a:rPr lang="en-US" altLang="ja-JP" sz="2400" i="1" smtClean="0">
+                                  <a:latin typeface="Cambria Math" panose="02040503050406030204" pitchFamily="18" charset="0"/>
+                                </a:rPr>
+                              </m:ctrlPr>
+                            </m:sSupPr>
+                            <m:e>
+                              <m:d>
+                                <m:dPr>
+                                  <m:begChr m:val="["/>
+                                  <m:endChr m:val="]"/>
+                                  <m:ctrlPr>
+                                    <a:rPr lang="en-US" altLang="ja-JP" sz="2400" i="1" smtClean="0">
+                                      <a:latin typeface="Cambria Math" panose="02040503050406030204" pitchFamily="18" charset="0"/>
+                                    </a:rPr>
+                                  </m:ctrlPr>
+                                </m:dPr>
+                                <m:e>
+                                  <m:f>
+                                    <m:fPr>
+                                      <m:ctrlPr>
+                                        <a:rPr lang="en-US" altLang="ja-JP" sz="2400" i="1" smtClean="0">
+                                          <a:latin typeface="Cambria Math" panose="02040503050406030204" pitchFamily="18" charset="0"/>
+                                        </a:rPr>
+                                      </m:ctrlPr>
+                                    </m:fPr>
+                                    <m:num>
+                                      <m:sSub>
+                                        <m:sSubPr>
+                                          <m:ctrlPr>
+                                            <a:rPr lang="en-US" altLang="ja-JP" sz="2400" i="1">
+                                              <a:latin typeface="Cambria Math" panose="02040503050406030204" pitchFamily="18" charset="0"/>
+                                            </a:rPr>
+                                          </m:ctrlPr>
+                                        </m:sSubPr>
+                                        <m:e>
+                                          <m:r>
+                                            <a:rPr lang="en-US" altLang="ja-JP" sz="2400" b="0" i="1" smtClean="0">
+                                              <a:latin typeface="Cambria Math" panose="02040503050406030204" pitchFamily="18" charset="0"/>
+                                            </a:rPr>
+                                            <m:t>𝑥</m:t>
+                                          </m:r>
+                                        </m:e>
+                                        <m:sub>
+                                          <m:r>
+                                            <a:rPr lang="en-US" altLang="ja-JP" sz="2400" i="1">
+                                              <a:latin typeface="Cambria Math" panose="02040503050406030204" pitchFamily="18" charset="0"/>
+                                            </a:rPr>
+                                            <m:t>𝑗</m:t>
+                                          </m:r>
+                                        </m:sub>
+                                      </m:sSub>
+                                    </m:num>
+                                    <m:den>
+                                      <m:sSub>
+                                        <m:sSubPr>
+                                          <m:ctrlPr>
+                                            <a:rPr lang="en-US" altLang="ja-JP" sz="2400" i="1">
+                                              <a:latin typeface="Cambria Math" panose="02040503050406030204" pitchFamily="18" charset="0"/>
+                                            </a:rPr>
+                                          </m:ctrlPr>
+                                        </m:sSubPr>
+                                        <m:e>
+                                          <m:r>
+                                            <a:rPr lang="en-US" altLang="ja-JP" sz="2400" b="0" i="1" smtClean="0">
+                                              <a:latin typeface="Cambria Math" panose="02040503050406030204" pitchFamily="18" charset="0"/>
+                                            </a:rPr>
+                                            <m:t>𝑎</m:t>
+                                          </m:r>
+                                        </m:e>
+                                        <m:sub>
+                                          <m:r>
+                                            <a:rPr lang="en-US" altLang="ja-JP" sz="2400" i="1">
+                                              <a:latin typeface="Cambria Math" panose="02040503050406030204" pitchFamily="18" charset="0"/>
+                                            </a:rPr>
+                                            <m:t>𝑗</m:t>
+                                          </m:r>
+                                        </m:sub>
+                                      </m:sSub>
+                                    </m:den>
+                                  </m:f>
+                                </m:e>
+                              </m:d>
+                            </m:e>
+                            <m:sup>
+                              <m:sSub>
+                                <m:sSubPr>
+                                  <m:ctrlPr>
+                                    <a:rPr lang="en-US" altLang="ja-JP" sz="2400" i="1">
+                                      <a:latin typeface="Cambria Math" panose="02040503050406030204" pitchFamily="18" charset="0"/>
+                                    </a:rPr>
+                                  </m:ctrlPr>
+                                </m:sSubPr>
+                                <m:e>
+                                  <m:acc>
+                                    <m:accPr>
+                                      <m:chr m:val="̃"/>
+                                      <m:ctrlPr>
+                                        <a:rPr lang="en-US" altLang="ja-JP" sz="2400" i="1">
+                                          <a:latin typeface="Cambria Math" panose="02040503050406030204" pitchFamily="18" charset="0"/>
+                                        </a:rPr>
+                                      </m:ctrlPr>
+                                    </m:accPr>
+                                    <m:e>
+                                      <m:r>
+                                        <a:rPr lang="en-US" altLang="ja-JP" sz="2400" i="1">
+                                          <a:latin typeface="Cambria Math" panose="02040503050406030204" pitchFamily="18" charset="0"/>
+                                        </a:rPr>
+                                        <m:t>𝑓</m:t>
+                                      </m:r>
+                                    </m:e>
+                                  </m:acc>
+                                </m:e>
+                                <m:sub>
+                                  <m:r>
+                                    <a:rPr lang="en-US" altLang="ja-JP" sz="2400" i="1">
+                                      <a:latin typeface="Cambria Math" panose="02040503050406030204" pitchFamily="18" charset="0"/>
+                                    </a:rPr>
+                                    <m:t>𝑗</m:t>
+                                  </m:r>
+                                </m:sub>
+                              </m:sSub>
+                            </m:sup>
+                          </m:sSup>
+                        </m:e>
+                      </m:nary>
+                      <m:r>
+                        <a:rPr lang="en-US" altLang="ja-JP" sz="2400" i="1" smtClean="0">
+                          <a:latin typeface="Cambria Math" panose="02040503050406030204" pitchFamily="18" charset="0"/>
+                          <a:ea typeface="Cambria Math" panose="02040503050406030204" pitchFamily="18" charset="0"/>
+                        </a:rPr>
+                        <m:t>≤</m:t>
+                      </m:r>
+                      <m:nary>
+                        <m:naryPr>
+                          <m:chr m:val="∑"/>
+                          <m:limLoc m:val="subSup"/>
+                          <m:supHide m:val="on"/>
+                          <m:ctrlPr>
+                            <a:rPr lang="en-US" altLang="ja-JP" sz="2400" i="1" smtClean="0">
+                              <a:latin typeface="Cambria Math" panose="02040503050406030204" pitchFamily="18" charset="0"/>
+                              <a:ea typeface="Cambria Math" panose="02040503050406030204" pitchFamily="18" charset="0"/>
+                            </a:rPr>
+                          </m:ctrlPr>
+                        </m:naryPr>
+                        <m:sub>
+                          <m:r>
+                            <m:rPr>
+                              <m:brk m:alnAt="9"/>
+                            </m:rPr>
+                            <a:rPr lang="en-US" altLang="ja-JP" sz="2400" b="0" i="1" smtClean="0">
+                              <a:latin typeface="Cambria Math" panose="02040503050406030204" pitchFamily="18" charset="0"/>
+                              <a:ea typeface="Cambria Math" panose="02040503050406030204" pitchFamily="18" charset="0"/>
+                            </a:rPr>
+                            <m:t>𝑗</m:t>
+                          </m:r>
+                        </m:sub>
+                        <m:sup/>
+                        <m:e>
+                          <m:sSub>
+                            <m:sSubPr>
+                              <m:ctrlPr>
+                                <a:rPr lang="en-US" altLang="ja-JP" sz="2400" i="1">
+                                  <a:latin typeface="Cambria Math" panose="02040503050406030204" pitchFamily="18" charset="0"/>
+                                </a:rPr>
+                              </m:ctrlPr>
+                            </m:sSubPr>
+                            <m:e>
+                              <m:acc>
+                                <m:accPr>
+                                  <m:chr m:val="̃"/>
+                                  <m:ctrlPr>
+                                    <a:rPr lang="en-US" altLang="ja-JP" sz="2400" i="1">
+                                      <a:latin typeface="Cambria Math" panose="02040503050406030204" pitchFamily="18" charset="0"/>
+                                    </a:rPr>
+                                  </m:ctrlPr>
+                                </m:accPr>
+                                <m:e>
+                                  <m:r>
+                                    <a:rPr lang="en-US" altLang="ja-JP" sz="2400" i="1">
+                                      <a:latin typeface="Cambria Math" panose="02040503050406030204" pitchFamily="18" charset="0"/>
+                                    </a:rPr>
+                                    <m:t>𝑓</m:t>
+                                  </m:r>
+                                </m:e>
+                              </m:acc>
+                            </m:e>
+                            <m:sub>
+                              <m:r>
+                                <a:rPr lang="en-US" altLang="ja-JP" sz="2400" i="1">
+                                  <a:latin typeface="Cambria Math" panose="02040503050406030204" pitchFamily="18" charset="0"/>
+                                </a:rPr>
+                                <m:t>𝑗</m:t>
+                              </m:r>
+                            </m:sub>
+                          </m:sSub>
+                          <m:f>
+                            <m:fPr>
+                              <m:ctrlPr>
+                                <a:rPr lang="en-US" altLang="ja-JP" sz="2400" i="1">
+                                  <a:latin typeface="Cambria Math" panose="02040503050406030204" pitchFamily="18" charset="0"/>
+                                </a:rPr>
+                              </m:ctrlPr>
+                            </m:fPr>
+                            <m:num>
+                              <m:sSub>
+                                <m:sSubPr>
+                                  <m:ctrlPr>
+                                    <a:rPr lang="en-US" altLang="ja-JP" sz="2400" i="1">
+                                      <a:latin typeface="Cambria Math" panose="02040503050406030204" pitchFamily="18" charset="0"/>
+                                    </a:rPr>
+                                  </m:ctrlPr>
+                                </m:sSubPr>
+                                <m:e>
+                                  <m:r>
+                                    <a:rPr lang="en-US" altLang="ja-JP" sz="2400" i="1">
+                                      <a:latin typeface="Cambria Math" panose="02040503050406030204" pitchFamily="18" charset="0"/>
+                                    </a:rPr>
+                                    <m:t>𝑥</m:t>
+                                  </m:r>
+                                </m:e>
+                                <m:sub>
+                                  <m:r>
+                                    <a:rPr lang="en-US" altLang="ja-JP" sz="2400" i="1">
+                                      <a:latin typeface="Cambria Math" panose="02040503050406030204" pitchFamily="18" charset="0"/>
+                                    </a:rPr>
+                                    <m:t>𝑗</m:t>
+                                  </m:r>
+                                </m:sub>
+                              </m:sSub>
+                            </m:num>
+                            <m:den>
+                              <m:sSub>
+                                <m:sSubPr>
+                                  <m:ctrlPr>
+                                    <a:rPr lang="en-US" altLang="ja-JP" sz="2400" i="1">
+                                      <a:latin typeface="Cambria Math" panose="02040503050406030204" pitchFamily="18" charset="0"/>
+                                    </a:rPr>
+                                  </m:ctrlPr>
+                                </m:sSubPr>
+                                <m:e>
+                                  <m:r>
+                                    <a:rPr lang="en-US" altLang="ja-JP" sz="2400" i="1">
+                                      <a:latin typeface="Cambria Math" panose="02040503050406030204" pitchFamily="18" charset="0"/>
+                                    </a:rPr>
+                                    <m:t>𝑎</m:t>
+                                  </m:r>
+                                </m:e>
+                                <m:sub>
+                                  <m:r>
+                                    <a:rPr lang="en-US" altLang="ja-JP" sz="2400" i="1">
+                                      <a:latin typeface="Cambria Math" panose="02040503050406030204" pitchFamily="18" charset="0"/>
+                                    </a:rPr>
+                                    <m:t>𝑗</m:t>
+                                  </m:r>
+                                </m:sub>
+                              </m:sSub>
+                            </m:den>
+                          </m:f>
+                        </m:e>
+                      </m:nary>
+                      <m:r>
+                        <a:rPr lang="ja-JP" altLang="en-US" sz="2400" i="1">
+                          <a:latin typeface="Cambria Math" panose="02040503050406030204" pitchFamily="18" charset="0"/>
+                          <a:ea typeface="Cambria Math" panose="02040503050406030204" pitchFamily="18" charset="0"/>
+                        </a:rPr>
+                        <m:t>　</m:t>
+                      </m:r>
+                      <m:r>
+                        <a:rPr lang="ja-JP" altLang="en-US" sz="2400" i="1" smtClean="0">
+                          <a:latin typeface="Cambria Math" panose="02040503050406030204" pitchFamily="18" charset="0"/>
+                          <a:ea typeface="Cambria Math" panose="02040503050406030204" pitchFamily="18" charset="0"/>
+                        </a:rPr>
+                        <m:t>　</m:t>
+                      </m:r>
+                      <m:r>
+                        <a:rPr lang="ja-JP" altLang="en-US" sz="2400" i="1">
+                          <a:latin typeface="Cambria Math" panose="02040503050406030204" pitchFamily="18" charset="0"/>
+                          <a:ea typeface="Cambria Math" panose="02040503050406030204" pitchFamily="18" charset="0"/>
+                        </a:rPr>
+                        <m:t>　</m:t>
+                      </m:r>
+                      <m:d>
+                        <m:dPr>
+                          <m:ctrlPr>
+                            <a:rPr lang="en-US" altLang="ja-JP" sz="2400" i="1" smtClean="0">
+                              <a:latin typeface="Cambria Math" panose="02040503050406030204" pitchFamily="18" charset="0"/>
+                              <a:ea typeface="Cambria Math" panose="02040503050406030204" pitchFamily="18" charset="0"/>
+                            </a:rPr>
+                          </m:ctrlPr>
+                        </m:dPr>
+                        <m:e>
+                          <m:nary>
+                            <m:naryPr>
+                              <m:chr m:val="∑"/>
+                              <m:limLoc m:val="subSup"/>
+                              <m:supHide m:val="on"/>
+                              <m:ctrlPr>
+                                <a:rPr lang="en-US" altLang="ja-JP" sz="2400" i="1">
+                                  <a:latin typeface="Cambria Math" panose="02040503050406030204" pitchFamily="18" charset="0"/>
+                                </a:rPr>
+                              </m:ctrlPr>
+                            </m:naryPr>
+                            <m:sub>
+                              <m:r>
+                                <m:rPr>
+                                  <m:brk m:alnAt="9"/>
+                                </m:rPr>
+                                <a:rPr lang="en-US" altLang="ja-JP" sz="2400" i="1">
+                                  <a:latin typeface="Cambria Math" panose="02040503050406030204" pitchFamily="18" charset="0"/>
+                                </a:rPr>
+                                <m:t>𝑗</m:t>
+                              </m:r>
+                            </m:sub>
+                            <m:sup/>
+                            <m:e>
+                              <m:sSub>
+                                <m:sSubPr>
+                                  <m:ctrlPr>
+                                    <a:rPr lang="en-US" altLang="ja-JP" sz="2400" i="1">
+                                      <a:latin typeface="Cambria Math" panose="02040503050406030204" pitchFamily="18" charset="0"/>
+                                    </a:rPr>
+                                  </m:ctrlPr>
+                                </m:sSubPr>
+                                <m:e>
+                                  <m:r>
+                                    <a:rPr lang="en-US" altLang="ja-JP" sz="2400" i="1">
+                                      <a:latin typeface="Cambria Math" panose="02040503050406030204" pitchFamily="18" charset="0"/>
+                                    </a:rPr>
+                                    <m:t>𝑥</m:t>
+                                  </m:r>
+                                </m:e>
+                                <m:sub>
+                                  <m:r>
+                                    <a:rPr lang="en-US" altLang="ja-JP" sz="2400" i="1">
+                                      <a:latin typeface="Cambria Math" panose="02040503050406030204" pitchFamily="18" charset="0"/>
+                                    </a:rPr>
+                                    <m:t>𝑗</m:t>
+                                  </m:r>
+                                </m:sub>
+                              </m:sSub>
+                            </m:e>
+                          </m:nary>
+                          <m:r>
+                            <a:rPr lang="en-US" altLang="ja-JP" sz="2400" i="1">
+                              <a:latin typeface="Cambria Math" panose="02040503050406030204" pitchFamily="18" charset="0"/>
+                            </a:rPr>
+                            <m:t>=1,</m:t>
+                          </m:r>
+                          <m:sSub>
+                            <m:sSubPr>
+                              <m:ctrlPr>
+                                <a:rPr lang="en-US" altLang="ja-JP" sz="2400" i="1">
+                                  <a:latin typeface="Cambria Math" panose="02040503050406030204" pitchFamily="18" charset="0"/>
+                                </a:rPr>
+                              </m:ctrlPr>
+                            </m:sSubPr>
+                            <m:e>
+                              <m:r>
+                                <a:rPr lang="en-US" altLang="ja-JP" sz="2400" i="1">
+                                  <a:latin typeface="Cambria Math" panose="02040503050406030204" pitchFamily="18" charset="0"/>
+                                </a:rPr>
+                                <m:t>𝑥</m:t>
+                              </m:r>
+                            </m:e>
+                            <m:sub>
+                              <m:r>
+                                <a:rPr lang="en-US" altLang="ja-JP" sz="2400" i="1">
+                                  <a:latin typeface="Cambria Math" panose="02040503050406030204" pitchFamily="18" charset="0"/>
+                                </a:rPr>
+                                <m:t>𝑗</m:t>
+                              </m:r>
+                            </m:sub>
+                          </m:sSub>
+                          <m:r>
+                            <a:rPr lang="en-US" altLang="ja-JP" sz="2400" i="1">
+                              <a:latin typeface="Cambria Math" panose="02040503050406030204" pitchFamily="18" charset="0"/>
+                              <a:ea typeface="Cambria Math" panose="02040503050406030204" pitchFamily="18" charset="0"/>
+                            </a:rPr>
+                            <m:t>≥0,</m:t>
+                          </m:r>
+                          <m:sSub>
+                            <m:sSubPr>
+                              <m:ctrlPr>
+                                <a:rPr lang="en-US" altLang="ja-JP" sz="2400" i="1">
+                                  <a:latin typeface="Cambria Math" panose="02040503050406030204" pitchFamily="18" charset="0"/>
+                                </a:rPr>
+                              </m:ctrlPr>
+                            </m:sSubPr>
+                            <m:e>
+                              <m:r>
+                                <a:rPr lang="en-US" altLang="ja-JP" sz="2400" i="1">
+                                  <a:latin typeface="Cambria Math" panose="02040503050406030204" pitchFamily="18" charset="0"/>
+                                </a:rPr>
+                                <m:t>𝑎</m:t>
+                              </m:r>
+                            </m:e>
+                            <m:sub>
+                              <m:r>
+                                <a:rPr lang="en-US" altLang="ja-JP" sz="2400" i="1">
+                                  <a:latin typeface="Cambria Math" panose="02040503050406030204" pitchFamily="18" charset="0"/>
+                                </a:rPr>
+                                <m:t>𝑗</m:t>
+                              </m:r>
+                            </m:sub>
+                          </m:sSub>
+                          <m:r>
+                            <a:rPr lang="ja-JP" altLang="en-US" sz="2400">
+                              <a:latin typeface="Cambria Math" panose="02040503050406030204" pitchFamily="18" charset="0"/>
+                            </a:rPr>
+                            <m:t>&gt;</m:t>
+                          </m:r>
+                          <m:r>
+                            <a:rPr lang="en-US" altLang="ja-JP" sz="2400">
+                              <a:latin typeface="Cambria Math" panose="02040503050406030204" pitchFamily="18" charset="0"/>
+                            </a:rPr>
+                            <m:t>0</m:t>
+                          </m:r>
+                          <m:r>
+                            <m:rPr>
+                              <m:nor/>
+                            </m:rPr>
+                            <a:rPr lang="en-US" altLang="ja-JP" sz="2400" dirty="0"/>
+                            <m:t> </m:t>
+                          </m:r>
+                        </m:e>
+                      </m:d>
+                    </m:oMath>
+                  </m:oMathPara>
+                </a14:m>
+                <a:endParaRPr lang="en-US" altLang="ja-JP" sz="2400" dirty="0" smtClean="0"/>
+              </a:p>
+              <a:p>
+                <a:pPr marL="0" indent="0">
+                  <a:buNone/>
+                </a:pPr>
+                <a:r>
+                  <a:rPr lang="ja-JP" altLang="en-US" sz="2400" dirty="0" smtClean="0"/>
+                  <a:t>これから、</a:t>
+                </a:r>
+                <a:endParaRPr lang="en-US" altLang="ja-JP" sz="2400" dirty="0" smtClean="0"/>
+              </a:p>
+              <a:p>
+                <a:pPr marL="0" indent="0">
+                  <a:buNone/>
+                </a:pPr>
+                <a14:m>
+                  <m:oMathPara xmlns:m="http://schemas.openxmlformats.org/officeDocument/2006/math">
+                    <m:oMathParaPr>
+                      <m:jc m:val="centerGroup"/>
+                    </m:oMathParaPr>
+                    <m:oMath xmlns:m="http://schemas.openxmlformats.org/officeDocument/2006/math">
+                      <m:sSup>
+                        <m:sSupPr>
+                          <m:ctrlPr>
+                            <a:rPr lang="en-US" altLang="ja-JP" sz="2400" i="1" smtClean="0">
+                              <a:latin typeface="Cambria Math" panose="02040503050406030204" pitchFamily="18" charset="0"/>
+                            </a:rPr>
+                          </m:ctrlPr>
+                        </m:sSupPr>
+                        <m:e>
+                          <m:d>
+                            <m:dPr>
+                              <m:ctrlPr>
+                                <a:rPr lang="en-US" altLang="ja-JP" sz="2400" i="1" smtClean="0">
+                                  <a:latin typeface="Cambria Math" panose="02040503050406030204" pitchFamily="18" charset="0"/>
+                                </a:rPr>
+                              </m:ctrlPr>
+                            </m:dPr>
+                            <m:e>
+                              <m:r>
+                                <m:rPr>
+                                  <m:nor/>
+                                </m:rPr>
+                                <a:rPr lang="en-US" altLang="ja-JP" sz="2400" dirty="0">
+                                  <a:latin typeface="Lucida Calligraphy" panose="03010101010101010101" pitchFamily="66" charset="0"/>
+                                </a:rPr>
+                                <m:t>L</m:t>
+                              </m:r>
+                              <m:d>
+                                <m:dPr>
+                                  <m:ctrlPr>
+                                    <a:rPr lang="en-US" altLang="ja-JP" sz="2400" i="1">
+                                      <a:latin typeface="Cambria Math" panose="02040503050406030204" pitchFamily="18" charset="0"/>
+                                    </a:rPr>
+                                  </m:ctrlPr>
+                                </m:dPr>
+                                <m:e>
+                                  <m:acc>
+                                    <m:accPr>
+                                      <m:chr m:val="̂"/>
+                                      <m:ctrlPr>
+                                        <a:rPr lang="ja-JP" altLang="en-US" sz="2400" i="1">
+                                          <a:latin typeface="Cambria Math" panose="02040503050406030204" pitchFamily="18" charset="0"/>
+                                        </a:rPr>
+                                      </m:ctrlPr>
+                                    </m:accPr>
+                                    <m:e>
+                                      <m:r>
+                                        <a:rPr lang="ja-JP" altLang="en-US" sz="2400" i="1">
+                                          <a:latin typeface="Cambria Math" panose="02040503050406030204" pitchFamily="18" charset="0"/>
+                                        </a:rPr>
+                                        <m:t>𝜌</m:t>
+                                      </m:r>
+                                    </m:e>
+                                  </m:acc>
+                                </m:e>
+                              </m:d>
+                            </m:e>
+                          </m:d>
+                        </m:e>
+                        <m:sup>
+                          <m:f>
+                            <m:fPr>
+                              <m:type m:val="lin"/>
+                              <m:ctrlPr>
+                                <a:rPr lang="en-US" altLang="ja-JP" sz="2400" i="1" smtClean="0">
+                                  <a:latin typeface="Cambria Math" panose="02040503050406030204" pitchFamily="18" charset="0"/>
+                                </a:rPr>
+                              </m:ctrlPr>
+                            </m:fPr>
+                            <m:num>
+                              <m:r>
+                                <a:rPr lang="en-US" altLang="ja-JP" sz="2400" b="0" i="1" smtClean="0">
+                                  <a:latin typeface="Cambria Math" panose="02040503050406030204" pitchFamily="18" charset="0"/>
+                                </a:rPr>
+                                <m:t>1</m:t>
+                              </m:r>
+                            </m:num>
+                            <m:den>
+                              <m:r>
+                                <a:rPr lang="en-US" altLang="ja-JP" sz="2400" b="0" i="1" smtClean="0">
+                                  <a:latin typeface="Cambria Math" panose="02040503050406030204" pitchFamily="18" charset="0"/>
+                                </a:rPr>
+                                <m:t>𝑛</m:t>
+                              </m:r>
+                            </m:den>
+                          </m:f>
+                        </m:sup>
+                      </m:sSup>
+                      <m:r>
+                        <a:rPr lang="en-US" altLang="ja-JP" sz="2400" b="0" i="1" smtClean="0">
+                          <a:latin typeface="Cambria Math" panose="02040503050406030204" pitchFamily="18" charset="0"/>
+                        </a:rPr>
+                        <m:t>=</m:t>
+                      </m:r>
+                      <m:nary>
+                        <m:naryPr>
+                          <m:chr m:val="∏"/>
+                          <m:limLoc m:val="subSup"/>
+                          <m:supHide m:val="on"/>
+                          <m:ctrlPr>
+                            <a:rPr lang="en-US" altLang="ja-JP" sz="2400" i="1">
+                              <a:latin typeface="Cambria Math" panose="02040503050406030204" pitchFamily="18" charset="0"/>
+                            </a:rPr>
+                          </m:ctrlPr>
+                        </m:naryPr>
+                        <m:sub>
+                          <m:r>
+                            <m:rPr>
+                              <m:brk m:alnAt="9"/>
+                            </m:rPr>
+                            <a:rPr lang="en-US" altLang="ja-JP" sz="2400" i="1">
+                              <a:latin typeface="Cambria Math" panose="02040503050406030204" pitchFamily="18" charset="0"/>
+                            </a:rPr>
+                            <m:t>𝑗</m:t>
+                          </m:r>
+                        </m:sub>
+                        <m:sup/>
+                        <m:e>
+                          <m:sSup>
+                            <m:sSupPr>
+                              <m:ctrlPr>
+                                <a:rPr lang="en-US" altLang="ja-JP" sz="2400" i="1">
+                                  <a:latin typeface="Cambria Math" panose="02040503050406030204" pitchFamily="18" charset="0"/>
+                                </a:rPr>
+                              </m:ctrlPr>
+                            </m:sSupPr>
+                            <m:e>
+                              <m:d>
+                                <m:dPr>
+                                  <m:ctrlPr>
+                                    <a:rPr lang="en-US" altLang="ja-JP" sz="2400" i="1" smtClean="0">
+                                      <a:latin typeface="Cambria Math" panose="02040503050406030204" pitchFamily="18" charset="0"/>
+                                    </a:rPr>
+                                  </m:ctrlPr>
+                                </m:dPr>
+                                <m:e>
+                                  <m:r>
+                                    <m:rPr>
+                                      <m:sty m:val="p"/>
+                                    </m:rPr>
+                                    <a:rPr lang="en-US" altLang="ja-JP" sz="2400">
+                                      <a:latin typeface="Cambria Math" panose="02040503050406030204" pitchFamily="18" charset="0"/>
+                                    </a:rPr>
+                                    <m:t>Tr</m:t>
+                                  </m:r>
+                                  <m:d>
+                                    <m:dPr>
+                                      <m:begChr m:val="["/>
+                                      <m:endChr m:val="]"/>
+                                      <m:ctrlPr>
+                                        <a:rPr lang="en-US" altLang="ja-JP" sz="2400" i="1">
+                                          <a:latin typeface="Cambria Math" panose="02040503050406030204" pitchFamily="18" charset="0"/>
+                                        </a:rPr>
+                                      </m:ctrlPr>
+                                    </m:dPr>
+                                    <m:e>
+                                      <m:acc>
+                                        <m:accPr>
+                                          <m:chr m:val="̂"/>
+                                          <m:ctrlPr>
+                                            <a:rPr lang="ja-JP" altLang="en-US" sz="2400" i="1">
+                                              <a:latin typeface="Cambria Math" panose="02040503050406030204" pitchFamily="18" charset="0"/>
+                                            </a:rPr>
+                                          </m:ctrlPr>
+                                        </m:accPr>
+                                        <m:e>
+                                          <m:r>
+                                            <a:rPr lang="ja-JP" altLang="en-US" sz="2400" i="1">
+                                              <a:latin typeface="Cambria Math" panose="02040503050406030204" pitchFamily="18" charset="0"/>
+                                            </a:rPr>
+                                            <m:t>𝜌</m:t>
+                                          </m:r>
+                                        </m:e>
+                                      </m:acc>
+                                      <m:sSub>
+                                        <m:sSubPr>
+                                          <m:ctrlPr>
+                                            <a:rPr lang="en-US" altLang="ja-JP" sz="2400" i="1">
+                                              <a:latin typeface="Cambria Math" panose="02040503050406030204" pitchFamily="18" charset="0"/>
+                                            </a:rPr>
+                                          </m:ctrlPr>
+                                        </m:sSubPr>
+                                        <m:e>
+                                          <m:acc>
+                                            <m:accPr>
+                                              <m:chr m:val="̂"/>
+                                              <m:ctrlPr>
+                                                <a:rPr lang="ja-JP" altLang="en-US" sz="2400" i="1">
+                                                  <a:latin typeface="Cambria Math" panose="02040503050406030204" pitchFamily="18" charset="0"/>
+                                                </a:rPr>
+                                              </m:ctrlPr>
+                                            </m:accPr>
+                                            <m:e>
+                                              <m:r>
+                                                <m:rPr>
+                                                  <m:sty m:val="p"/>
+                                                </m:rPr>
+                                                <a:rPr lang="en-US" altLang="ja-JP" sz="2400" i="1">
+                                                  <a:latin typeface="Cambria Math" panose="02040503050406030204" pitchFamily="18" charset="0"/>
+                                                </a:rPr>
+                                                <m:t>Π</m:t>
+                                              </m:r>
+                                            </m:e>
+                                          </m:acc>
+                                        </m:e>
+                                        <m:sub>
+                                          <m:r>
+                                            <a:rPr lang="en-US" altLang="ja-JP" sz="2400" i="1">
+                                              <a:latin typeface="Cambria Math" panose="02040503050406030204" pitchFamily="18" charset="0"/>
+                                            </a:rPr>
+                                            <m:t>𝑗</m:t>
+                                          </m:r>
+                                        </m:sub>
+                                      </m:sSub>
+                                    </m:e>
+                                  </m:d>
+                                </m:e>
+                              </m:d>
+                            </m:e>
+                            <m:sup>
+                              <m:sSub>
+                                <m:sSubPr>
+                                  <m:ctrlPr>
+                                    <a:rPr lang="en-US" altLang="ja-JP" sz="2400" i="1">
+                                      <a:latin typeface="Cambria Math" panose="02040503050406030204" pitchFamily="18" charset="0"/>
+                                    </a:rPr>
+                                  </m:ctrlPr>
+                                </m:sSubPr>
+                                <m:e>
+                                  <m:acc>
+                                    <m:accPr>
+                                      <m:chr m:val="̃"/>
+                                      <m:ctrlPr>
+                                        <a:rPr lang="en-US" altLang="ja-JP" sz="2400" i="1">
+                                          <a:latin typeface="Cambria Math" panose="02040503050406030204" pitchFamily="18" charset="0"/>
+                                        </a:rPr>
+                                      </m:ctrlPr>
+                                    </m:accPr>
+                                    <m:e>
+                                      <m:r>
+                                        <a:rPr lang="en-US" altLang="ja-JP" sz="2400" i="1">
+                                          <a:latin typeface="Cambria Math" panose="02040503050406030204" pitchFamily="18" charset="0"/>
+                                        </a:rPr>
+                                        <m:t>𝑓</m:t>
+                                      </m:r>
+                                    </m:e>
+                                  </m:acc>
+                                </m:e>
+                                <m:sub>
+                                  <m:r>
+                                    <a:rPr lang="en-US" altLang="ja-JP" sz="2400" i="1">
+                                      <a:latin typeface="Cambria Math" panose="02040503050406030204" pitchFamily="18" charset="0"/>
+                                    </a:rPr>
+                                    <m:t>𝑗</m:t>
+                                  </m:r>
+                                </m:sub>
+                              </m:sSub>
+                            </m:sup>
+                          </m:sSup>
+                        </m:e>
+                      </m:nary>
+                      <m:r>
+                        <a:rPr lang="en-US" altLang="ja-JP" sz="2400" i="1" smtClean="0">
+                          <a:latin typeface="Cambria Math" panose="02040503050406030204" pitchFamily="18" charset="0"/>
+                          <a:ea typeface="Cambria Math" panose="02040503050406030204" pitchFamily="18" charset="0"/>
+                        </a:rPr>
+                        <m:t>≤</m:t>
+                      </m:r>
+                      <m:nary>
+                        <m:naryPr>
+                          <m:chr m:val="∏"/>
+                          <m:limLoc m:val="subSup"/>
+                          <m:supHide m:val="on"/>
+                          <m:ctrlPr>
+                            <a:rPr lang="en-US" altLang="ja-JP" sz="2400" i="1" smtClean="0">
+                              <a:latin typeface="Cambria Math" panose="02040503050406030204" pitchFamily="18" charset="0"/>
+                            </a:rPr>
+                          </m:ctrlPr>
+                        </m:naryPr>
+                        <m:sub>
+                          <m:r>
+                            <m:rPr>
+                              <m:brk m:alnAt="9"/>
+                            </m:rPr>
+                            <a:rPr lang="en-US" altLang="ja-JP" sz="2400" i="1">
+                              <a:latin typeface="Cambria Math" panose="02040503050406030204" pitchFamily="18" charset="0"/>
+                            </a:rPr>
+                            <m:t>𝑗</m:t>
+                          </m:r>
+                        </m:sub>
+                        <m:sup/>
+                        <m:e>
+                          <m:sSup>
+                            <m:sSupPr>
+                              <m:ctrlPr>
+                                <a:rPr lang="en-US" altLang="ja-JP" sz="2400" i="1">
+                                  <a:latin typeface="Cambria Math" panose="02040503050406030204" pitchFamily="18" charset="0"/>
+                                </a:rPr>
+                              </m:ctrlPr>
+                            </m:sSupPr>
+                            <m:e>
+                              <m:sSub>
+                                <m:sSubPr>
+                                  <m:ctrlPr>
+                                    <a:rPr lang="en-US" altLang="ja-JP" sz="2400" i="1">
+                                      <a:latin typeface="Cambria Math" panose="02040503050406030204" pitchFamily="18" charset="0"/>
+                                    </a:rPr>
+                                  </m:ctrlPr>
+                                </m:sSubPr>
+                                <m:e>
+                                  <m:r>
+                                    <a:rPr lang="en-US" altLang="ja-JP" sz="2400" i="1">
+                                      <a:latin typeface="Cambria Math" panose="02040503050406030204" pitchFamily="18" charset="0"/>
+                                    </a:rPr>
+                                    <m:t>𝑎</m:t>
+                                  </m:r>
+                                </m:e>
+                                <m:sub>
+                                  <m:r>
+                                    <a:rPr lang="en-US" altLang="ja-JP" sz="2400" i="1">
+                                      <a:latin typeface="Cambria Math" panose="02040503050406030204" pitchFamily="18" charset="0"/>
+                                    </a:rPr>
+                                    <m:t>𝑗</m:t>
+                                  </m:r>
+                                </m:sub>
+                              </m:sSub>
+                            </m:e>
+                            <m:sup>
+                              <m:sSub>
+                                <m:sSubPr>
+                                  <m:ctrlPr>
+                                    <a:rPr lang="en-US" altLang="ja-JP" sz="2400" i="1">
+                                      <a:latin typeface="Cambria Math" panose="02040503050406030204" pitchFamily="18" charset="0"/>
+                                    </a:rPr>
+                                  </m:ctrlPr>
+                                </m:sSubPr>
+                                <m:e>
+                                  <m:acc>
+                                    <m:accPr>
+                                      <m:chr m:val="̃"/>
+                                      <m:ctrlPr>
+                                        <a:rPr lang="en-US" altLang="ja-JP" sz="2400" i="1">
+                                          <a:latin typeface="Cambria Math" panose="02040503050406030204" pitchFamily="18" charset="0"/>
+                                        </a:rPr>
+                                      </m:ctrlPr>
+                                    </m:accPr>
+                                    <m:e>
+                                      <m:r>
+                                        <a:rPr lang="en-US" altLang="ja-JP" sz="2400" i="1">
+                                          <a:latin typeface="Cambria Math" panose="02040503050406030204" pitchFamily="18" charset="0"/>
+                                        </a:rPr>
+                                        <m:t>𝑓</m:t>
+                                      </m:r>
+                                    </m:e>
+                                  </m:acc>
+                                </m:e>
+                                <m:sub>
+                                  <m:r>
+                                    <a:rPr lang="en-US" altLang="ja-JP" sz="2400" i="1">
+                                      <a:latin typeface="Cambria Math" panose="02040503050406030204" pitchFamily="18" charset="0"/>
+                                    </a:rPr>
+                                    <m:t>𝑗</m:t>
+                                  </m:r>
+                                </m:sub>
+                              </m:sSub>
+                            </m:sup>
+                          </m:sSup>
+                          <m:r>
+                            <m:rPr>
+                              <m:sty m:val="p"/>
+                            </m:rPr>
+                            <a:rPr lang="en-US" altLang="ja-JP" sz="2400">
+                              <a:latin typeface="Cambria Math" panose="02040503050406030204" pitchFamily="18" charset="0"/>
+                            </a:rPr>
+                            <m:t>Tr</m:t>
+                          </m:r>
+                          <m:d>
+                            <m:dPr>
+                              <m:begChr m:val="["/>
+                              <m:endChr m:val="]"/>
+                              <m:ctrlPr>
+                                <a:rPr lang="en-US" altLang="ja-JP" sz="2400" i="1">
+                                  <a:latin typeface="Cambria Math" panose="02040503050406030204" pitchFamily="18" charset="0"/>
+                                </a:rPr>
+                              </m:ctrlPr>
+                            </m:dPr>
+                            <m:e>
+                              <m:acc>
+                                <m:accPr>
+                                  <m:chr m:val="̂"/>
+                                  <m:ctrlPr>
+                                    <a:rPr lang="ja-JP" altLang="en-US" sz="2400" i="1">
+                                      <a:latin typeface="Cambria Math" panose="02040503050406030204" pitchFamily="18" charset="0"/>
+                                    </a:rPr>
+                                  </m:ctrlPr>
+                                </m:accPr>
+                                <m:e>
+                                  <m:r>
+                                    <a:rPr lang="ja-JP" altLang="en-US" sz="2400" i="1">
+                                      <a:latin typeface="Cambria Math" panose="02040503050406030204" pitchFamily="18" charset="0"/>
+                                    </a:rPr>
+                                    <m:t>𝜌</m:t>
+                                  </m:r>
+                                </m:e>
+                              </m:acc>
+                              <m:acc>
+                                <m:accPr>
+                                  <m:chr m:val="̂"/>
+                                  <m:ctrlPr>
+                                    <a:rPr lang="ja-JP" altLang="en-US" sz="2400" i="1" smtClean="0">
+                                      <a:latin typeface="Cambria Math" panose="02040503050406030204" pitchFamily="18" charset="0"/>
+                                    </a:rPr>
+                                  </m:ctrlPr>
+                                </m:accPr>
+                                <m:e>
+                                  <m:r>
+                                    <a:rPr lang="en-US" altLang="ja-JP" sz="2400" b="0" i="1" smtClean="0">
+                                      <a:latin typeface="Cambria Math" panose="02040503050406030204" pitchFamily="18" charset="0"/>
+                                    </a:rPr>
+                                    <m:t>𝑅</m:t>
+                                  </m:r>
+                                </m:e>
+                              </m:acc>
+                              <m:d>
+                                <m:dPr>
+                                  <m:ctrlPr>
+                                    <a:rPr lang="en-US" altLang="ja-JP" sz="2400" i="1">
+                                      <a:latin typeface="Cambria Math" panose="02040503050406030204" pitchFamily="18" charset="0"/>
+                                    </a:rPr>
+                                  </m:ctrlPr>
+                                </m:dPr>
+                                <m:e>
+                                  <m:acc>
+                                    <m:accPr>
+                                      <m:chr m:val="̂"/>
+                                      <m:ctrlPr>
+                                        <a:rPr lang="ja-JP" altLang="en-US" sz="2400" b="1" i="1">
+                                          <a:latin typeface="Cambria Math" panose="02040503050406030204" pitchFamily="18" charset="0"/>
+                                        </a:rPr>
+                                      </m:ctrlPr>
+                                    </m:accPr>
+                                    <m:e>
+                                      <m:r>
+                                        <a:rPr lang="en-US" altLang="ja-JP" sz="2400" b="1">
+                                          <a:latin typeface="Cambria Math" panose="02040503050406030204" pitchFamily="18" charset="0"/>
+                                        </a:rPr>
+                                        <m:t>𝚷</m:t>
+                                      </m:r>
+                                    </m:e>
+                                  </m:acc>
+                                  <m:r>
+                                    <a:rPr lang="en-US" altLang="ja-JP" sz="2400" b="1" i="1">
+                                      <a:latin typeface="Cambria Math" panose="02040503050406030204" pitchFamily="18" charset="0"/>
+                                    </a:rPr>
+                                    <m:t>, </m:t>
+                                  </m:r>
+                                  <m:r>
+                                    <a:rPr lang="en-US" altLang="ja-JP" sz="2400" b="1" i="1">
+                                      <a:latin typeface="Cambria Math" panose="02040503050406030204" pitchFamily="18" charset="0"/>
+                                    </a:rPr>
+                                    <m:t>𝒂</m:t>
+                                  </m:r>
+                                </m:e>
+                              </m:d>
+                            </m:e>
+                          </m:d>
+                        </m:e>
+                      </m:nary>
+                    </m:oMath>
+                  </m:oMathPara>
+                </a14:m>
+                <a:endParaRPr lang="en-US" altLang="ja-JP" sz="2400" dirty="0" smtClean="0"/>
+              </a:p>
+              <a:p>
+                <a:pPr marL="0" indent="0">
+                  <a:buNone/>
+                </a:pPr>
+                <a14:m>
+                  <m:oMathPara xmlns:m="http://schemas.openxmlformats.org/officeDocument/2006/math">
+                    <m:oMathParaPr>
+                      <m:jc m:val="centerGroup"/>
+                    </m:oMathParaPr>
+                    <m:oMath xmlns:m="http://schemas.openxmlformats.org/officeDocument/2006/math">
+                      <m:acc>
+                        <m:accPr>
+                          <m:chr m:val="̂"/>
+                          <m:ctrlPr>
+                            <a:rPr lang="ja-JP" altLang="en-US" sz="2400" i="1" smtClean="0">
+                              <a:latin typeface="Cambria Math" panose="02040503050406030204" pitchFamily="18" charset="0"/>
+                            </a:rPr>
+                          </m:ctrlPr>
+                        </m:accPr>
+                        <m:e>
+                          <m:r>
+                            <a:rPr lang="en-US" altLang="ja-JP" sz="2400" i="1">
+                              <a:latin typeface="Cambria Math" panose="02040503050406030204" pitchFamily="18" charset="0"/>
+                            </a:rPr>
+                            <m:t>𝑅</m:t>
+                          </m:r>
+                        </m:e>
+                      </m:acc>
+                      <m:d>
+                        <m:dPr>
+                          <m:ctrlPr>
+                            <a:rPr lang="en-US" altLang="ja-JP" sz="2400" i="1" smtClean="0">
+                              <a:latin typeface="Cambria Math" panose="02040503050406030204" pitchFamily="18" charset="0"/>
+                            </a:rPr>
+                          </m:ctrlPr>
+                        </m:dPr>
+                        <m:e>
+                          <m:acc>
+                            <m:accPr>
+                              <m:chr m:val="̂"/>
+                              <m:ctrlPr>
+                                <a:rPr lang="ja-JP" altLang="en-US" sz="2400" b="1">
+                                  <a:latin typeface="Cambria Math" panose="02040503050406030204" pitchFamily="18" charset="0"/>
+                                </a:rPr>
+                              </m:ctrlPr>
+                            </m:accPr>
+                            <m:e>
+                              <m:r>
+                                <a:rPr lang="en-US" altLang="ja-JP" sz="2400" b="1" i="0">
+                                  <a:latin typeface="Cambria Math" panose="02040503050406030204" pitchFamily="18" charset="0"/>
+                                </a:rPr>
+                                <m:t>𝚷</m:t>
+                              </m:r>
+                            </m:e>
+                          </m:acc>
+                          <m:r>
+                            <a:rPr lang="en-US" altLang="ja-JP" sz="2400" b="1" i="1" smtClean="0">
+                              <a:latin typeface="Cambria Math" panose="02040503050406030204" pitchFamily="18" charset="0"/>
+                            </a:rPr>
+                            <m:t>, </m:t>
+                          </m:r>
+                          <m:r>
+                            <a:rPr lang="en-US" altLang="ja-JP" sz="2400" b="1" i="1" smtClean="0">
+                              <a:latin typeface="Cambria Math" panose="02040503050406030204" pitchFamily="18" charset="0"/>
+                            </a:rPr>
+                            <m:t>𝒂</m:t>
+                          </m:r>
+                        </m:e>
+                      </m:d>
+                      <m:r>
+                        <a:rPr lang="en-US" altLang="ja-JP" sz="2400" b="0" i="1" smtClean="0">
+                          <a:latin typeface="Cambria Math" panose="02040503050406030204" pitchFamily="18" charset="0"/>
+                        </a:rPr>
+                        <m:t>=</m:t>
+                      </m:r>
+                      <m:nary>
+                        <m:naryPr>
+                          <m:chr m:val="∑"/>
+                          <m:limLoc m:val="subSup"/>
+                          <m:supHide m:val="on"/>
+                          <m:ctrlPr>
+                            <a:rPr lang="en-US" altLang="ja-JP" sz="2400" i="1">
+                              <a:latin typeface="Cambria Math" panose="02040503050406030204" pitchFamily="18" charset="0"/>
+                              <a:ea typeface="Cambria Math" panose="02040503050406030204" pitchFamily="18" charset="0"/>
+                            </a:rPr>
+                          </m:ctrlPr>
+                        </m:naryPr>
+                        <m:sub>
+                          <m:r>
+                            <m:rPr>
+                              <m:brk m:alnAt="1"/>
+                            </m:rPr>
+                            <a:rPr lang="en-US" altLang="ja-JP" sz="2400" b="0" i="1" smtClean="0">
+                              <a:latin typeface="Cambria Math" panose="02040503050406030204" pitchFamily="18" charset="0"/>
+                              <a:ea typeface="Cambria Math" panose="02040503050406030204" pitchFamily="18" charset="0"/>
+                            </a:rPr>
+                            <m:t>𝑖</m:t>
+                          </m:r>
+                        </m:sub>
+                        <m:sup/>
+                        <m:e>
+                          <m:f>
+                            <m:fPr>
+                              <m:ctrlPr>
+                                <a:rPr lang="en-US" altLang="ja-JP" sz="2400" i="1">
+                                  <a:latin typeface="Cambria Math" panose="02040503050406030204" pitchFamily="18" charset="0"/>
+                                </a:rPr>
+                              </m:ctrlPr>
+                            </m:fPr>
+                            <m:num>
+                              <m:sSub>
+                                <m:sSubPr>
+                                  <m:ctrlPr>
+                                    <a:rPr lang="en-US" altLang="ja-JP" sz="2400" i="1">
+                                      <a:latin typeface="Cambria Math" panose="02040503050406030204" pitchFamily="18" charset="0"/>
+                                    </a:rPr>
+                                  </m:ctrlPr>
+                                </m:sSubPr>
+                                <m:e>
+                                  <m:acc>
+                                    <m:accPr>
+                                      <m:chr m:val="̃"/>
+                                      <m:ctrlPr>
+                                        <a:rPr lang="en-US" altLang="ja-JP" sz="2400" i="1">
+                                          <a:latin typeface="Cambria Math" panose="02040503050406030204" pitchFamily="18" charset="0"/>
+                                        </a:rPr>
+                                      </m:ctrlPr>
+                                    </m:accPr>
+                                    <m:e>
+                                      <m:r>
+                                        <a:rPr lang="en-US" altLang="ja-JP" sz="2400" i="1">
+                                          <a:latin typeface="Cambria Math" panose="02040503050406030204" pitchFamily="18" charset="0"/>
+                                        </a:rPr>
+                                        <m:t>𝑓</m:t>
+                                      </m:r>
+                                    </m:e>
+                                  </m:acc>
+                                </m:e>
+                                <m:sub>
+                                  <m:r>
+                                    <a:rPr lang="en-US" altLang="ja-JP" sz="2400" b="0" i="1" smtClean="0">
+                                      <a:latin typeface="Cambria Math" panose="02040503050406030204" pitchFamily="18" charset="0"/>
+                                    </a:rPr>
+                                    <m:t>𝑖</m:t>
+                                  </m:r>
+                                </m:sub>
+                              </m:sSub>
+                            </m:num>
+                            <m:den>
+                              <m:sSub>
+                                <m:sSubPr>
+                                  <m:ctrlPr>
+                                    <a:rPr lang="en-US" altLang="ja-JP" sz="2400" i="1">
+                                      <a:latin typeface="Cambria Math" panose="02040503050406030204" pitchFamily="18" charset="0"/>
+                                    </a:rPr>
+                                  </m:ctrlPr>
+                                </m:sSubPr>
+                                <m:e>
+                                  <m:r>
+                                    <a:rPr lang="en-US" altLang="ja-JP" sz="2400" i="1">
+                                      <a:latin typeface="Cambria Math" panose="02040503050406030204" pitchFamily="18" charset="0"/>
+                                    </a:rPr>
+                                    <m:t>𝑎</m:t>
+                                  </m:r>
+                                </m:e>
+                                <m:sub>
+                                  <m:r>
+                                    <a:rPr lang="en-US" altLang="ja-JP" sz="2400" b="0" i="1" smtClean="0">
+                                      <a:latin typeface="Cambria Math" panose="02040503050406030204" pitchFamily="18" charset="0"/>
+                                    </a:rPr>
+                                    <m:t>𝑖</m:t>
+                                  </m:r>
+                                </m:sub>
+                              </m:sSub>
+                            </m:den>
+                          </m:f>
+                        </m:e>
+                      </m:nary>
+                      <m:sSub>
+                        <m:sSubPr>
+                          <m:ctrlPr>
+                            <a:rPr lang="en-US" altLang="ja-JP" sz="2400" i="1">
+                              <a:latin typeface="Cambria Math" panose="02040503050406030204" pitchFamily="18" charset="0"/>
+                            </a:rPr>
+                          </m:ctrlPr>
+                        </m:sSubPr>
+                        <m:e>
+                          <m:acc>
+                            <m:accPr>
+                              <m:chr m:val="̂"/>
+                              <m:ctrlPr>
+                                <a:rPr lang="ja-JP" altLang="en-US" sz="2400" i="1">
+                                  <a:latin typeface="Cambria Math" panose="02040503050406030204" pitchFamily="18" charset="0"/>
+                                </a:rPr>
+                              </m:ctrlPr>
+                            </m:accPr>
+                            <m:e>
+                              <m:r>
+                                <m:rPr>
+                                  <m:sty m:val="p"/>
+                                </m:rPr>
+                                <a:rPr lang="en-US" altLang="ja-JP" sz="2400" i="1">
+                                  <a:latin typeface="Cambria Math" panose="02040503050406030204" pitchFamily="18" charset="0"/>
+                                </a:rPr>
+                                <m:t>Π</m:t>
+                              </m:r>
+                            </m:e>
+                          </m:acc>
+                        </m:e>
+                        <m:sub>
+                          <m:r>
+                            <a:rPr lang="en-US" altLang="ja-JP" sz="2400" b="0" i="1" smtClean="0">
+                              <a:latin typeface="Cambria Math" panose="02040503050406030204" pitchFamily="18" charset="0"/>
+                            </a:rPr>
+                            <m:t>𝑖</m:t>
+                          </m:r>
+                        </m:sub>
+                      </m:sSub>
+                    </m:oMath>
+                  </m:oMathPara>
+                </a14:m>
+                <a:endParaRPr lang="en-US" altLang="ja-JP" sz="2400" dirty="0" smtClean="0"/>
+              </a:p>
+              <a:p>
+                <a:pPr marL="0" indent="0">
+                  <a:buNone/>
+                </a:pPr>
+                <a:r>
+                  <a:rPr lang="ja-JP" altLang="en-US" sz="2400" dirty="0" smtClean="0"/>
+                  <a:t>より</a:t>
+                </a:r>
+                <a:r>
+                  <a:rPr lang="ja-JP" altLang="en-US" sz="2400" dirty="0" smtClean="0"/>
+                  <a:t>、尤度関数は常に増加する。</a:t>
+                </a:r>
+                <a:endParaRPr lang="en-US" altLang="ja-JP" sz="2400" dirty="0" smtClean="0"/>
+              </a:p>
+              <a:p>
+                <a:pPr marL="0" indent="0">
+                  <a:buNone/>
+                </a:pPr>
+                <a:endParaRPr lang="en-US" altLang="ja-JP" sz="2400" dirty="0" smtClean="0"/>
+              </a:p>
+            </p:txBody>
+          </p:sp>
+        </mc:Choice>
+        <mc:Fallback>
+          <p:sp>
+            <p:nvSpPr>
+              <p:cNvPr id="3" name="コンテンツ プレースホルダー 2"/>
+              <p:cNvSpPr>
+                <a:spLocks noGrp="1" noRot="1" noChangeAspect="1" noMove="1" noResize="1" noEditPoints="1" noAdjustHandles="1" noChangeArrowheads="1" noChangeShapeType="1" noTextEdit="1"/>
+              </p:cNvSpPr>
+              <p:nvPr>
+                <p:ph idx="1"/>
+              </p:nvPr>
+            </p:nvSpPr>
+            <p:spPr>
+              <a:xfrm>
+                <a:off x="838200" y="1215614"/>
+                <a:ext cx="10515600" cy="4961349"/>
+              </a:xfrm>
+              <a:blipFill>
+                <a:blip r:embed="rId3"/>
+                <a:stretch>
+                  <a:fillRect l="-928" t="-1597"/>
+                </a:stretch>
+              </a:blipFill>
+            </p:spPr>
+            <p:txBody>
+              <a:bodyPr/>
+              <a:lstStyle/>
+              <a:p>
+                <a:r>
+                  <a:rPr lang="ja-JP" altLang="en-US">
+                    <a:noFill/>
+                  </a:rPr>
+                  <a:t> </a:t>
+                </a:r>
+              </a:p>
+            </p:txBody>
+          </p:sp>
+        </mc:Fallback>
+      </mc:AlternateContent>
     </p:spTree>
     <p:extLst>
       <p:ext uri="{BB962C8B-B14F-4D97-AF65-F5344CB8AC3E}">
@@ -28858,8 +30364,8 @@
           </a:p>
         </p:txBody>
       </p:sp>
-      <mc:AlternateContent xmlns:mc="http://schemas.openxmlformats.org/markup-compatibility/2006" xmlns:a14="http://schemas.microsoft.com/office/drawing/2010/main">
-        <mc:Choice Requires="a14">
+      <mc:AlternateContent xmlns:mc="http://schemas.openxmlformats.org/markup-compatibility/2006">
+        <mc:Choice xmlns:a14="http://schemas.microsoft.com/office/drawing/2010/main" Requires="a14">
           <p:sp>
             <p:nvSpPr>
               <p:cNvPr id="3" name="コンテンツ プレースホルダー 2"/>
@@ -30103,7 +31609,7 @@
                     </m:oMath>
                   </m:oMathPara>
                 </a14:m>
-                <a:endParaRPr lang="en-US" altLang="ja-JP" sz="2400" i="1" dirty="0"/>
+                <a:endParaRPr lang="en-US" altLang="ja-JP" sz="2400" b="0" dirty="0" smtClean="0"/>
               </a:p>
               <a:p>
                 <a:pPr marL="0" indent="0">
@@ -30111,7 +31617,11 @@
                 </a:pPr>
                 <a:r>
                   <a:rPr lang="ja-JP" altLang="en-US" sz="2400" dirty="0" smtClean="0"/>
-                  <a:t>で表される。</a:t>
+                  <a:t>で</a:t>
+                </a:r>
+                <a:r>
+                  <a:rPr lang="ja-JP" altLang="en-US" sz="2400" dirty="0" smtClean="0"/>
+                  <a:t>表される。</a:t>
                 </a:r>
                 <a:r>
                   <a:rPr lang="en-US" altLang="ja-JP" sz="2400" dirty="0" smtClean="0"/>
@@ -30139,7 +31649,7 @@
             </p:txBody>
           </p:sp>
         </mc:Choice>
-        <mc:Fallback xmlns="">
+        <mc:Fallback>
           <p:sp>
             <p:nvSpPr>
               <p:cNvPr id="3" name="コンテンツ プレースホルダー 2"/>

</xml_diff>